<commit_message>
Read me file and PPT
</commit_message>
<xml_diff>
--- a/PPT/Unit test.pptx
+++ b/PPT/Unit test.pptx
@@ -2,19 +2,28 @@
 <file path=ppt/presentation.xml><?xml version="1.0" encoding="utf-8"?>
 <p:presentation xmlns:a="http://schemas.openxmlformats.org/drawingml/2006/main" xmlns:r="http://schemas.openxmlformats.org/officeDocument/2006/relationships" xmlns:p="http://schemas.openxmlformats.org/presentationml/2006/main" saveSubsetFonts="1">
   <p:sldMasterIdLst>
-    <p:sldMasterId id="2147483790" r:id="rId1"/>
+    <p:sldMasterId id="2147483831" r:id="rId1"/>
   </p:sldMasterIdLst>
   <p:sldIdLst>
     <p:sldId id="256" r:id="rId2"/>
-    <p:sldId id="265" r:id="rId3"/>
-    <p:sldId id="263" r:id="rId4"/>
-    <p:sldId id="264" r:id="rId5"/>
-    <p:sldId id="266" r:id="rId6"/>
-    <p:sldId id="261" r:id="rId7"/>
-    <p:sldId id="262" r:id="rId8"/>
-    <p:sldId id="258" r:id="rId9"/>
-    <p:sldId id="259" r:id="rId10"/>
-    <p:sldId id="260" r:id="rId11"/>
+    <p:sldId id="268" r:id="rId3"/>
+    <p:sldId id="269" r:id="rId4"/>
+    <p:sldId id="271" r:id="rId5"/>
+    <p:sldId id="272" r:id="rId6"/>
+    <p:sldId id="273" r:id="rId7"/>
+    <p:sldId id="274" r:id="rId8"/>
+    <p:sldId id="263" r:id="rId9"/>
+    <p:sldId id="264" r:id="rId10"/>
+    <p:sldId id="265" r:id="rId11"/>
+    <p:sldId id="275" r:id="rId12"/>
+    <p:sldId id="266" r:id="rId13"/>
+    <p:sldId id="261" r:id="rId14"/>
+    <p:sldId id="262" r:id="rId15"/>
+    <p:sldId id="258" r:id="rId16"/>
+    <p:sldId id="259" r:id="rId17"/>
+    <p:sldId id="260" r:id="rId18"/>
+    <p:sldId id="277" r:id="rId19"/>
+    <p:sldId id="278" r:id="rId20"/>
   </p:sldIdLst>
   <p:sldSz cx="12192000" cy="6858000"/>
   <p:notesSz cx="6858000" cy="9144000"/>
@@ -122,7 +131,7 @@
 </file>
 
 <file path=ppt/slideLayouts/slideLayout1.xml><?xml version="1.0" encoding="utf-8"?>
-<p:sldLayout xmlns:a="http://schemas.openxmlformats.org/drawingml/2006/main" xmlns:r="http://schemas.openxmlformats.org/officeDocument/2006/relationships" xmlns:p="http://schemas.openxmlformats.org/presentationml/2006/main" type="title" preserve="1">
+<p:sldLayout xmlns:a="http://schemas.openxmlformats.org/drawingml/2006/main" xmlns:r="http://schemas.openxmlformats.org/officeDocument/2006/relationships" xmlns:p="http://schemas.openxmlformats.org/presentationml/2006/main" showMasterSp="0" type="title" preserve="1">
   <p:cSld name="Title Slide">
     <p:spTree>
       <p:nvGrpSpPr>
@@ -140,25 +149,291 @@
       </p:grpSpPr>
       <p:sp>
         <p:nvSpPr>
-          <p:cNvPr id="2" name="Title 1"/>
-          <p:cNvSpPr>
-            <a:spLocks noGrp="1"/>
-          </p:cNvSpPr>
-          <p:nvPr>
-            <p:ph type="ctrTitle"/>
-          </p:nvPr>
+          <p:cNvPr id="7" name="Rectangle 6"/>
+          <p:cNvSpPr/>
+          <p:nvPr/>
         </p:nvSpPr>
         <p:spPr>
           <a:xfrm>
-            <a:off x="1524000" y="1122363"/>
-            <a:ext cx="9144000" cy="2387600"/>
+            <a:off x="920834" y="1346946"/>
+            <a:ext cx="10222992" cy="80683"/>
+          </a:xfrm>
+          <a:prstGeom prst="rect">
+            <a:avLst/>
+          </a:prstGeom>
+          <a:blipFill dpi="0" rotWithShape="1">
+            <a:blip r:embed="rId2">
+              <a:alphaModFix amt="85000"/>
+              <a:lum bright="70000" contrast="-70000"/>
+              <a:extLst>
+                <a:ext uri="{BEBA8EAE-BF5A-486C-A8C5-ECC9F3942E4B}">
+                  <a14:imgProps xmlns:a14="http://schemas.microsoft.com/office/drawing/2010/main">
+                    <a14:imgLayer r:embed="rId3">
+                      <a14:imgEffect>
+                        <a14:sharpenSoften amount="61000"/>
+                      </a14:imgEffect>
+                    </a14:imgLayer>
+                  </a14:imgProps>
+                </a:ext>
+                <a:ext uri="{28A0092B-C50C-407E-A947-70E740481C1C}">
+                  <a14:useLocalDpi xmlns:a14="http://schemas.microsoft.com/office/drawing/2010/main" val="0"/>
+                </a:ext>
+              </a:extLst>
+            </a:blip>
+            <a:srcRect/>
+            <a:tile tx="0" ty="-762000" sx="92000" sy="89000" flip="xy" algn="ctr"/>
+          </a:blipFill>
+          <a:ln>
+            <a:noFill/>
+          </a:ln>
+        </p:spPr>
+        <p:style>
+          <a:lnRef idx="2">
+            <a:schemeClr val="accent1">
+              <a:shade val="50000"/>
+            </a:schemeClr>
+          </a:lnRef>
+          <a:fillRef idx="1">
+            <a:schemeClr val="accent1"/>
+          </a:fillRef>
+          <a:effectRef idx="0">
+            <a:schemeClr val="accent1"/>
+          </a:effectRef>
+          <a:fontRef idx="minor">
+            <a:schemeClr val="lt1"/>
+          </a:fontRef>
+        </p:style>
+      </p:sp>
+      <p:sp>
+        <p:nvSpPr>
+          <p:cNvPr id="8" name="Rectangle 7"/>
+          <p:cNvSpPr/>
+          <p:nvPr/>
+        </p:nvSpPr>
+        <p:spPr>
+          <a:xfrm>
+            <a:off x="920834" y="4299696"/>
+            <a:ext cx="10222992" cy="80683"/>
+          </a:xfrm>
+          <a:prstGeom prst="rect">
+            <a:avLst/>
+          </a:prstGeom>
+          <a:blipFill dpi="0" rotWithShape="1">
+            <a:blip r:embed="rId2">
+              <a:alphaModFix amt="85000"/>
+              <a:lum bright="70000" contrast="-70000"/>
+              <a:extLst>
+                <a:ext uri="{BEBA8EAE-BF5A-486C-A8C5-ECC9F3942E4B}">
+                  <a14:imgProps xmlns:a14="http://schemas.microsoft.com/office/drawing/2010/main">
+                    <a14:imgLayer r:embed="rId3">
+                      <a14:imgEffect>
+                        <a14:sharpenSoften amount="61000"/>
+                      </a14:imgEffect>
+                    </a14:imgLayer>
+                  </a14:imgProps>
+                </a:ext>
+                <a:ext uri="{28A0092B-C50C-407E-A947-70E740481C1C}">
+                  <a14:useLocalDpi xmlns:a14="http://schemas.microsoft.com/office/drawing/2010/main" val="0"/>
+                </a:ext>
+              </a:extLst>
+            </a:blip>
+            <a:srcRect/>
+            <a:tile tx="0" ty="-717550" sx="92000" sy="89000" flip="xy" algn="ctr"/>
+          </a:blipFill>
+          <a:ln>
+            <a:noFill/>
+          </a:ln>
+        </p:spPr>
+        <p:style>
+          <a:lnRef idx="2">
+            <a:schemeClr val="accent1">
+              <a:shade val="50000"/>
+            </a:schemeClr>
+          </a:lnRef>
+          <a:fillRef idx="1">
+            <a:schemeClr val="accent1"/>
+          </a:fillRef>
+          <a:effectRef idx="0">
+            <a:schemeClr val="accent1"/>
+          </a:effectRef>
+          <a:fontRef idx="minor">
+            <a:schemeClr val="lt1"/>
+          </a:fontRef>
+        </p:style>
+      </p:sp>
+      <p:sp>
+        <p:nvSpPr>
+          <p:cNvPr id="9" name="Rectangle 8"/>
+          <p:cNvSpPr/>
+          <p:nvPr/>
+        </p:nvSpPr>
+        <p:spPr>
+          <a:xfrm>
+            <a:off x="920834" y="1484779"/>
+            <a:ext cx="10222992" cy="2743200"/>
+          </a:xfrm>
+          <a:prstGeom prst="rect">
+            <a:avLst/>
+          </a:prstGeom>
+          <a:blipFill dpi="0" rotWithShape="1">
+            <a:blip r:embed="rId2">
+              <a:alphaModFix amt="85000"/>
+              <a:lum bright="70000" contrast="-70000"/>
+              <a:extLst>
+                <a:ext uri="{BEBA8EAE-BF5A-486C-A8C5-ECC9F3942E4B}">
+                  <a14:imgProps xmlns:a14="http://schemas.microsoft.com/office/drawing/2010/main">
+                    <a14:imgLayer r:embed="rId3">
+                      <a14:imgEffect>
+                        <a14:sharpenSoften amount="61000"/>
+                      </a14:imgEffect>
+                    </a14:imgLayer>
+                  </a14:imgProps>
+                </a:ext>
+                <a:ext uri="{28A0092B-C50C-407E-A947-70E740481C1C}">
+                  <a14:useLocalDpi xmlns:a14="http://schemas.microsoft.com/office/drawing/2010/main" val="0"/>
+                </a:ext>
+              </a:extLst>
+            </a:blip>
+            <a:srcRect/>
+            <a:tile tx="0" ty="-704850" sx="92000" sy="89000" flip="xy" algn="ctr"/>
+          </a:blipFill>
+          <a:ln>
+            <a:noFill/>
+          </a:ln>
+        </p:spPr>
+        <p:style>
+          <a:lnRef idx="2">
+            <a:schemeClr val="accent1">
+              <a:shade val="50000"/>
+            </a:schemeClr>
+          </a:lnRef>
+          <a:fillRef idx="1">
+            <a:schemeClr val="accent1"/>
+          </a:fillRef>
+          <a:effectRef idx="0">
+            <a:schemeClr val="accent1"/>
+          </a:effectRef>
+          <a:fontRef idx="minor">
+            <a:schemeClr val="lt1"/>
+          </a:fontRef>
+        </p:style>
+      </p:sp>
+      <p:grpSp>
+        <p:nvGrpSpPr>
+          <p:cNvPr id="10" name="Group 9"/>
+          <p:cNvGrpSpPr/>
+          <p:nvPr/>
+        </p:nvGrpSpPr>
+        <p:grpSpPr>
+          <a:xfrm>
+            <a:off x="9649215" y="4068923"/>
+            <a:ext cx="1080904" cy="1080902"/>
+            <a:chOff x="9685338" y="4460675"/>
+            <a:chExt cx="1080904" cy="1080902"/>
+          </a:xfrm>
+        </p:grpSpPr>
+        <p:sp>
+          <p:nvSpPr>
+            <p:cNvPr id="11" name="Oval 10"/>
+            <p:cNvSpPr/>
+            <p:nvPr/>
+          </p:nvSpPr>
+          <p:spPr>
+            <a:xfrm>
+              <a:off x="9685338" y="4460675"/>
+              <a:ext cx="1080904" cy="1080902"/>
+            </a:xfrm>
+            <a:prstGeom prst="ellipse">
+              <a:avLst/>
+            </a:prstGeom>
+            <a:blipFill dpi="0" rotWithShape="1">
+              <a:blip r:embed="rId4">
+                <a:duotone>
+                  <a:schemeClr val="accent1">
+                    <a:shade val="45000"/>
+                    <a:satMod val="135000"/>
+                  </a:schemeClr>
+                  <a:prstClr val="white"/>
+                </a:duotone>
+                <a:extLst>
+                  <a:ext uri="{BEBA8EAE-BF5A-486C-A8C5-ECC9F3942E4B}">
+                    <a14:imgProps xmlns:a14="http://schemas.microsoft.com/office/drawing/2010/main">
+                      <a14:imgLayer r:embed="rId5">
+                        <a14:imgEffect>
+                          <a14:saturation sat="95000"/>
+                        </a14:imgEffect>
+                      </a14:imgLayer>
+                    </a14:imgProps>
+                  </a:ext>
+                </a:extLst>
+              </a:blip>
+              <a:srcRect/>
+              <a:tile tx="0" ty="0" sx="85000" sy="85000" flip="none" algn="tl"/>
+            </a:blipFill>
+            <a:ln w="25400" cap="flat" cmpd="sng" algn="ctr">
+              <a:noFill/>
+              <a:prstDash val="solid"/>
+            </a:ln>
+            <a:effectLst/>
+          </p:spPr>
+        </p:sp>
+        <p:sp>
+          <p:nvSpPr>
+            <p:cNvPr id="12" name="Oval 11"/>
+            <p:cNvSpPr/>
+            <p:nvPr/>
+          </p:nvSpPr>
+          <p:spPr>
+            <a:xfrm>
+              <a:off x="9793429" y="4568765"/>
+              <a:ext cx="864723" cy="864722"/>
+            </a:xfrm>
+            <a:prstGeom prst="ellipse">
+              <a:avLst/>
+            </a:prstGeom>
+            <a:noFill/>
+            <a:ln w="25400" cap="flat" cmpd="sng" algn="ctr">
+              <a:solidFill>
+                <a:sysClr val="window" lastClr="FFFFFF"/>
+              </a:solidFill>
+              <a:prstDash val="solid"/>
+            </a:ln>
+            <a:effectLst/>
+          </p:spPr>
+        </p:sp>
+      </p:grpSp>
+      <p:sp>
+        <p:nvSpPr>
+          <p:cNvPr id="2" name="Title 1"/>
+          <p:cNvSpPr>
+            <a:spLocks noGrp="1"/>
+          </p:cNvSpPr>
+          <p:nvPr>
+            <p:ph type="ctrTitle"/>
+          </p:nvPr>
+        </p:nvSpPr>
+        <p:spPr>
+          <a:xfrm>
+            <a:off x="1051560" y="1432223"/>
+            <a:ext cx="9966960" cy="3035808"/>
           </a:xfrm>
         </p:spPr>
         <p:txBody>
-          <a:bodyPr anchor="b"/>
+          <a:bodyPr anchor="ctr">
+            <a:noAutofit/>
+          </a:bodyPr>
           <a:lstStyle>
-            <a:lvl1pPr algn="ctr">
-              <a:defRPr sz="6000"/>
+            <a:lvl1pPr algn="l">
+              <a:lnSpc>
+                <a:spcPct val="80000"/>
+              </a:lnSpc>
+              <a:defRPr sz="9600" cap="all" baseline="0">
+                <a:blipFill dpi="0" rotWithShape="1">
+                  <a:blip r:embed="rId4"/>
+                  <a:srcRect/>
+                  <a:tile tx="6350" ty="-127000" sx="65000" sy="64000" flip="none" algn="tl"/>
+                </a:blipFill>
+              </a:defRPr>
             </a:lvl1pPr>
           </a:lstStyle>
           <a:p>
@@ -166,7 +441,7 @@
               <a:rPr lang="en-US" smtClean="0"/>
               <a:t>Click to edit Master title style</a:t>
             </a:r>
-            <a:endParaRPr lang="en-IN"/>
+            <a:endParaRPr lang="en-US" dirty="0"/>
           </a:p>
         </p:txBody>
       </p:sp>
@@ -182,48 +457,54 @@
         </p:nvSpPr>
         <p:spPr>
           <a:xfrm>
-            <a:off x="1524000" y="3602038"/>
-            <a:ext cx="9144000" cy="1655762"/>
+            <a:off x="1069848" y="4389120"/>
+            <a:ext cx="7891272" cy="1069848"/>
           </a:xfrm>
         </p:spPr>
         <p:txBody>
-          <a:bodyPr/>
+          <a:bodyPr>
+            <a:normAutofit/>
+          </a:bodyPr>
           <a:lstStyle>
-            <a:lvl1pPr marL="0" indent="0" algn="ctr">
+            <a:lvl1pPr marL="0" indent="0" algn="l">
               <a:buNone/>
-              <a:defRPr sz="2400"/>
+              <a:defRPr sz="2200">
+                <a:solidFill>
+                  <a:schemeClr val="tx1"/>
+                </a:solidFill>
+              </a:defRPr>
             </a:lvl1pPr>
             <a:lvl2pPr marL="457200" indent="0" algn="ctr">
               <a:buNone/>
-              <a:defRPr sz="2000"/>
+              <a:defRPr sz="2200"/>
             </a:lvl2pPr>
             <a:lvl3pPr marL="914400" indent="0" algn="ctr">
               <a:buNone/>
-              <a:defRPr sz="1800"/>
+              <a:defRPr sz="2200"/>
             </a:lvl3pPr>
             <a:lvl4pPr marL="1371600" indent="0" algn="ctr">
               <a:buNone/>
-              <a:defRPr sz="1600"/>
+              <a:defRPr sz="2000"/>
             </a:lvl4pPr>
             <a:lvl5pPr marL="1828800" indent="0" algn="ctr">
               <a:buNone/>
-              <a:defRPr sz="1600"/>
+              <a:defRPr sz="2000"/>
             </a:lvl5pPr>
             <a:lvl6pPr marL="2286000" indent="0" algn="ctr">
               <a:buNone/>
-              <a:defRPr sz="1600"/>
+              <a:defRPr sz="2000"/>
             </a:lvl6pPr>
             <a:lvl7pPr marL="2743200" indent="0" algn="ctr">
               <a:buNone/>
-              <a:defRPr sz="1600"/>
+              <a:defRPr sz="2000"/>
             </a:lvl7pPr>
             <a:lvl8pPr marL="3200400" indent="0" algn="ctr">
               <a:buNone/>
-              <a:defRPr sz="1600"/>
+              <a:defRPr sz="2000"/>
             </a:lvl8pPr>
             <a:lvl9pPr marL="3657600" indent="0" algn="ctr">
               <a:buNone/>
-              <a:defRPr sz="1600"/>
+              <a:defRPr sz="2000"/>
             </a:lvl9pPr>
           </a:lstStyle>
           <a:p>
@@ -231,7 +512,7 @@
               <a:rPr lang="en-US" smtClean="0"/>
               <a:t>Click to edit Master subtitle style</a:t>
             </a:r>
-            <a:endParaRPr lang="en-IN"/>
+            <a:endParaRPr lang="en-US" dirty="0"/>
           </a:p>
         </p:txBody>
       </p:sp>
@@ -252,7 +533,7 @@
           <a:p>
             <a:fld id="{20BA9DDC-52D4-4332-8D45-91BD248B6AAE}" type="datetimeFigureOut">
               <a:rPr lang="en-IN" smtClean="0"/>
-              <a:t>19-06-2020</a:t>
+              <a:t>20-06-2020</a:t>
             </a:fld>
             <a:endParaRPr lang="en-IN"/>
           </a:p>
@@ -287,10 +568,19 @@
             <p:ph type="sldNum" sz="quarter" idx="12"/>
           </p:nvPr>
         </p:nvSpPr>
-        <p:spPr/>
+        <p:spPr>
+          <a:xfrm>
+            <a:off x="9592733" y="4289334"/>
+            <a:ext cx="1193868" cy="640080"/>
+          </a:xfrm>
+        </p:spPr>
         <p:txBody>
           <a:bodyPr/>
-          <a:lstStyle/>
+          <a:lstStyle>
+            <a:lvl1pPr>
+              <a:defRPr sz="2800"/>
+            </a:lvl1pPr>
+          </a:lstStyle>
           <a:p>
             <a:fld id="{0D55790A-045E-46BA-99A6-A42D51CB62C6}" type="slidenum">
               <a:rPr lang="en-IN" smtClean="0"/>
@@ -303,7 +593,7 @@
     </p:spTree>
     <p:extLst>
       <p:ext uri="{BB962C8B-B14F-4D97-AF65-F5344CB8AC3E}">
-        <p14:creationId xmlns:p14="http://schemas.microsoft.com/office/powerpoint/2010/main" val="2203286466"/>
+        <p14:creationId xmlns:p14="http://schemas.microsoft.com/office/powerpoint/2010/main" val="1061569738"/>
       </p:ext>
     </p:extLst>
   </p:cSld>
@@ -349,7 +639,7 @@
               <a:rPr lang="en-US" smtClean="0"/>
               <a:t>Click to edit Master title style</a:t>
             </a:r>
-            <a:endParaRPr lang="en-IN"/>
+            <a:endParaRPr lang="en-US" dirty="0"/>
           </a:p>
         </p:txBody>
       </p:sp>
@@ -401,7 +691,7 @@
               <a:rPr lang="en-US" smtClean="0"/>
               <a:t>Fifth level</a:t>
             </a:r>
-            <a:endParaRPr lang="en-IN"/>
+            <a:endParaRPr lang="en-US" dirty="0"/>
           </a:p>
         </p:txBody>
       </p:sp>
@@ -422,7 +712,7 @@
           <a:p>
             <a:fld id="{20BA9DDC-52D4-4332-8D45-91BD248B6AAE}" type="datetimeFigureOut">
               <a:rPr lang="en-IN" smtClean="0"/>
-              <a:t>19-06-2020</a:t>
+              <a:t>20-06-2020</a:t>
             </a:fld>
             <a:endParaRPr lang="en-IN"/>
           </a:p>
@@ -473,7 +763,7 @@
     </p:spTree>
     <p:extLst>
       <p:ext uri="{BB962C8B-B14F-4D97-AF65-F5344CB8AC3E}">
-        <p14:creationId xmlns:p14="http://schemas.microsoft.com/office/powerpoint/2010/main" val="3908088233"/>
+        <p14:creationId xmlns:p14="http://schemas.microsoft.com/office/powerpoint/2010/main" val="1271903767"/>
       </p:ext>
     </p:extLst>
   </p:cSld>
@@ -512,8 +802,8 @@
         </p:nvSpPr>
         <p:spPr>
           <a:xfrm>
-            <a:off x="8724900" y="365125"/>
-            <a:ext cx="2628900" cy="5811838"/>
+            <a:off x="8724900" y="533400"/>
+            <a:ext cx="2552700" cy="5638800"/>
           </a:xfrm>
         </p:spPr>
         <p:txBody>
@@ -524,7 +814,7 @@
               <a:rPr lang="en-US" smtClean="0"/>
               <a:t>Click to edit Master title style</a:t>
             </a:r>
-            <a:endParaRPr lang="en-IN"/>
+            <a:endParaRPr lang="en-US" dirty="0"/>
           </a:p>
         </p:txBody>
       </p:sp>
@@ -540,8 +830,8 @@
         </p:nvSpPr>
         <p:spPr>
           <a:xfrm>
-            <a:off x="838200" y="365125"/>
-            <a:ext cx="7734300" cy="5811838"/>
+            <a:off x="1066800" y="533400"/>
+            <a:ext cx="7505700" cy="5638800"/>
           </a:xfrm>
         </p:spPr>
         <p:txBody>
@@ -581,7 +871,7 @@
               <a:rPr lang="en-US" smtClean="0"/>
               <a:t>Fifth level</a:t>
             </a:r>
-            <a:endParaRPr lang="en-IN"/>
+            <a:endParaRPr lang="en-US" dirty="0"/>
           </a:p>
         </p:txBody>
       </p:sp>
@@ -602,7 +892,7 @@
           <a:p>
             <a:fld id="{20BA9DDC-52D4-4332-8D45-91BD248B6AAE}" type="datetimeFigureOut">
               <a:rPr lang="en-IN" smtClean="0"/>
-              <a:t>19-06-2020</a:t>
+              <a:t>20-06-2020</a:t>
             </a:fld>
             <a:endParaRPr lang="en-IN"/>
           </a:p>
@@ -653,7 +943,7 @@
     </p:spTree>
     <p:extLst>
       <p:ext uri="{BB962C8B-B14F-4D97-AF65-F5344CB8AC3E}">
-        <p14:creationId xmlns:p14="http://schemas.microsoft.com/office/powerpoint/2010/main" val="2311480219"/>
+        <p14:creationId xmlns:p14="http://schemas.microsoft.com/office/powerpoint/2010/main" val="2323957812"/>
       </p:ext>
     </p:extLst>
   </p:cSld>
@@ -699,7 +989,7 @@
               <a:rPr lang="en-US" smtClean="0"/>
               <a:t>Click to edit Master title style</a:t>
             </a:r>
-            <a:endParaRPr lang="en-IN"/>
+            <a:endParaRPr lang="en-US" dirty="0"/>
           </a:p>
         </p:txBody>
       </p:sp>
@@ -751,7 +1041,7 @@
               <a:rPr lang="en-US" smtClean="0"/>
               <a:t>Fifth level</a:t>
             </a:r>
-            <a:endParaRPr lang="en-IN"/>
+            <a:endParaRPr lang="en-US" dirty="0"/>
           </a:p>
         </p:txBody>
       </p:sp>
@@ -772,7 +1062,7 @@
           <a:p>
             <a:fld id="{20BA9DDC-52D4-4332-8D45-91BD248B6AAE}" type="datetimeFigureOut">
               <a:rPr lang="en-IN" smtClean="0"/>
-              <a:t>19-06-2020</a:t>
+              <a:t>20-06-2020</a:t>
             </a:fld>
             <a:endParaRPr lang="en-IN"/>
           </a:p>
@@ -823,7 +1113,7 @@
     </p:spTree>
     <p:extLst>
       <p:ext uri="{BB962C8B-B14F-4D97-AF65-F5344CB8AC3E}">
-        <p14:creationId xmlns:p14="http://schemas.microsoft.com/office/powerpoint/2010/main" val="2130890468"/>
+        <p14:creationId xmlns:p14="http://schemas.microsoft.com/office/powerpoint/2010/main" val="4237768341"/>
       </p:ext>
     </p:extLst>
   </p:cSld>
@@ -834,7 +1124,7 @@
 </file>
 
 <file path=ppt/slideLayouts/slideLayout3.xml><?xml version="1.0" encoding="utf-8"?>
-<p:sldLayout xmlns:a="http://schemas.openxmlformats.org/drawingml/2006/main" xmlns:r="http://schemas.openxmlformats.org/officeDocument/2006/relationships" xmlns:p="http://schemas.openxmlformats.org/presentationml/2006/main" type="secHead" preserve="1">
+<p:sldLayout xmlns:a="http://schemas.openxmlformats.org/drawingml/2006/main" xmlns:r="http://schemas.openxmlformats.org/officeDocument/2006/relationships" xmlns:p="http://schemas.openxmlformats.org/presentationml/2006/main" showMasterSp="0" type="secHead" preserve="1">
   <p:cSld name="Section Header">
     <p:spTree>
       <p:nvGrpSpPr>
@@ -852,25 +1142,87 @@
       </p:grpSpPr>
       <p:sp>
         <p:nvSpPr>
-          <p:cNvPr id="2" name="Title 1"/>
-          <p:cNvSpPr>
-            <a:spLocks noGrp="1"/>
-          </p:cNvSpPr>
-          <p:nvPr>
-            <p:ph type="title"/>
-          </p:nvPr>
+          <p:cNvPr id="7" name="Rectangle 6"/>
+          <p:cNvSpPr/>
+          <p:nvPr/>
         </p:nvSpPr>
         <p:spPr>
           <a:xfrm>
-            <a:off x="831850" y="1709738"/>
-            <a:ext cx="10515600" cy="2852737"/>
+            <a:off x="0" y="4917989"/>
+            <a:ext cx="12192000" cy="1940010"/>
+          </a:xfrm>
+          <a:prstGeom prst="rect">
+            <a:avLst/>
+          </a:prstGeom>
+          <a:blipFill dpi="0" rotWithShape="1">
+            <a:blip r:embed="rId2">
+              <a:alphaModFix amt="85000"/>
+              <a:lum bright="70000" contrast="-70000"/>
+              <a:extLst>
+                <a:ext uri="{BEBA8EAE-BF5A-486C-A8C5-ECC9F3942E4B}">
+                  <a14:imgProps xmlns:a14="http://schemas.microsoft.com/office/drawing/2010/main">
+                    <a14:imgLayer r:embed="rId3">
+                      <a14:imgEffect>
+                        <a14:sharpenSoften amount="61000"/>
+                      </a14:imgEffect>
+                    </a14:imgLayer>
+                  </a14:imgProps>
+                </a:ext>
+                <a:ext uri="{28A0092B-C50C-407E-A947-70E740481C1C}">
+                  <a14:useLocalDpi xmlns:a14="http://schemas.microsoft.com/office/drawing/2010/main" val="0"/>
+                </a:ext>
+              </a:extLst>
+            </a:blip>
+            <a:srcRect/>
+            <a:tile tx="0" ty="-704850" sx="92000" sy="89000" flip="xy" algn="ctr"/>
+          </a:blipFill>
+          <a:ln>
+            <a:noFill/>
+          </a:ln>
+        </p:spPr>
+        <p:style>
+          <a:lnRef idx="2">
+            <a:schemeClr val="accent1">
+              <a:shade val="50000"/>
+            </a:schemeClr>
+          </a:lnRef>
+          <a:fillRef idx="1">
+            <a:schemeClr val="accent1"/>
+          </a:fillRef>
+          <a:effectRef idx="0">
+            <a:schemeClr val="accent1"/>
+          </a:effectRef>
+          <a:fontRef idx="minor">
+            <a:schemeClr val="lt1"/>
+          </a:fontRef>
+        </p:style>
+      </p:sp>
+      <p:sp>
+        <p:nvSpPr>
+          <p:cNvPr id="2" name="Title 1"/>
+          <p:cNvSpPr>
+            <a:spLocks noGrp="1"/>
+          </p:cNvSpPr>
+          <p:nvPr>
+            <p:ph type="title"/>
+          </p:nvPr>
+        </p:nvSpPr>
+        <p:spPr>
+          <a:xfrm>
+            <a:off x="2167128" y="1225296"/>
+            <a:ext cx="9281160" cy="3520440"/>
           </a:xfrm>
         </p:spPr>
         <p:txBody>
-          <a:bodyPr anchor="b"/>
+          <a:bodyPr anchor="ctr">
+            <a:normAutofit/>
+          </a:bodyPr>
           <a:lstStyle>
             <a:lvl1pPr>
-              <a:defRPr sz="6000"/>
+              <a:lnSpc>
+                <a:spcPct val="80000"/>
+              </a:lnSpc>
+              <a:defRPr sz="8000" b="0"/>
             </a:lvl1pPr>
           </a:lstStyle>
           <a:p>
@@ -878,7 +1230,7 @@
               <a:rPr lang="en-US" smtClean="0"/>
               <a:t>Click to edit Master title style</a:t>
             </a:r>
-            <a:endParaRPr lang="en-IN"/>
+            <a:endParaRPr lang="en-US" dirty="0"/>
           </a:p>
         </p:txBody>
       </p:sp>
@@ -894,26 +1246,26 @@
         </p:nvSpPr>
         <p:spPr>
           <a:xfrm>
-            <a:off x="831850" y="4589463"/>
-            <a:ext cx="10515600" cy="1500187"/>
+            <a:off x="2165774" y="5020056"/>
+            <a:ext cx="9052560" cy="1066800"/>
           </a:xfrm>
         </p:spPr>
         <p:txBody>
-          <a:bodyPr/>
+          <a:bodyPr anchor="t">
+            <a:normAutofit/>
+          </a:bodyPr>
           <a:lstStyle>
             <a:lvl1pPr marL="0" indent="0">
               <a:buNone/>
-              <a:defRPr sz="2400">
+              <a:defRPr sz="2000">
                 <a:solidFill>
-                  <a:schemeClr val="tx1">
-                    <a:tint val="75000"/>
-                  </a:schemeClr>
+                  <a:schemeClr val="tx1"/>
                 </a:solidFill>
               </a:defRPr>
             </a:lvl1pPr>
             <a:lvl2pPr marL="457200" indent="0">
               <a:buNone/>
-              <a:defRPr sz="2000">
+              <a:defRPr sz="1800">
                 <a:solidFill>
                   <a:schemeClr val="tx1">
                     <a:tint val="75000"/>
@@ -923,7 +1275,7 @@
             </a:lvl2pPr>
             <a:lvl3pPr marL="914400" indent="0">
               <a:buNone/>
-              <a:defRPr sz="1800">
+              <a:defRPr sz="1600">
                 <a:solidFill>
                   <a:schemeClr val="tx1">
                     <a:tint val="75000"/>
@@ -933,7 +1285,7 @@
             </a:lvl3pPr>
             <a:lvl4pPr marL="1371600" indent="0">
               <a:buNone/>
-              <a:defRPr sz="1600">
+              <a:defRPr sz="1400">
                 <a:solidFill>
                   <a:schemeClr val="tx1">
                     <a:tint val="75000"/>
@@ -943,7 +1295,7 @@
             </a:lvl4pPr>
             <a:lvl5pPr marL="1828800" indent="0">
               <a:buNone/>
-              <a:defRPr sz="1600">
+              <a:defRPr sz="1400">
                 <a:solidFill>
                   <a:schemeClr val="tx1">
                     <a:tint val="75000"/>
@@ -953,7 +1305,7 @@
             </a:lvl5pPr>
             <a:lvl6pPr marL="2286000" indent="0">
               <a:buNone/>
-              <a:defRPr sz="1600">
+              <a:defRPr sz="1400">
                 <a:solidFill>
                   <a:schemeClr val="tx1">
                     <a:tint val="75000"/>
@@ -963,7 +1315,7 @@
             </a:lvl6pPr>
             <a:lvl7pPr marL="2743200" indent="0">
               <a:buNone/>
-              <a:defRPr sz="1600">
+              <a:defRPr sz="1400">
                 <a:solidFill>
                   <a:schemeClr val="tx1">
                     <a:tint val="75000"/>
@@ -973,7 +1325,7 @@
             </a:lvl7pPr>
             <a:lvl8pPr marL="3200400" indent="0">
               <a:buNone/>
-              <a:defRPr sz="1600">
+              <a:defRPr sz="1400">
                 <a:solidFill>
                   <a:schemeClr val="tx1">
                     <a:tint val="75000"/>
@@ -983,7 +1335,7 @@
             </a:lvl8pPr>
             <a:lvl9pPr marL="3657600" indent="0">
               <a:buNone/>
-              <a:defRPr sz="1600">
+              <a:defRPr sz="1400">
                 <a:solidFill>
                   <a:schemeClr val="tx1">
                     <a:tint val="75000"/>
@@ -1011,14 +1363,19 @@
             <p:ph type="dt" sz="half" idx="10"/>
           </p:nvPr>
         </p:nvSpPr>
-        <p:spPr/>
+        <p:spPr>
+          <a:xfrm>
+            <a:off x="8593667" y="6272784"/>
+            <a:ext cx="2644309" cy="365125"/>
+          </a:xfrm>
+        </p:spPr>
         <p:txBody>
           <a:bodyPr/>
           <a:lstStyle/>
           <a:p>
             <a:fld id="{20BA9DDC-52D4-4332-8D45-91BD248B6AAE}" type="datetimeFigureOut">
               <a:rPr lang="en-IN" smtClean="0"/>
-              <a:t>19-06-2020</a:t>
+              <a:t>20-06-2020</a:t>
             </a:fld>
             <a:endParaRPr lang="en-IN"/>
           </a:p>
@@ -1034,7 +1391,12 @@
             <p:ph type="ftr" sz="quarter" idx="11"/>
           </p:nvPr>
         </p:nvSpPr>
-        <p:spPr/>
+        <p:spPr>
+          <a:xfrm>
+            <a:off x="2182708" y="6272784"/>
+            <a:ext cx="6327648" cy="365125"/>
+          </a:xfrm>
+        </p:spPr>
         <p:txBody>
           <a:bodyPr/>
           <a:lstStyle/>
@@ -1043,6 +1405,90 @@
           </a:p>
         </p:txBody>
       </p:sp>
+      <p:grpSp>
+        <p:nvGrpSpPr>
+          <p:cNvPr id="8" name="Group 7"/>
+          <p:cNvGrpSpPr/>
+          <p:nvPr/>
+        </p:nvGrpSpPr>
+        <p:grpSpPr>
+          <a:xfrm>
+            <a:off x="897399" y="2325848"/>
+            <a:ext cx="1080904" cy="1080902"/>
+            <a:chOff x="9685338" y="4460675"/>
+            <a:chExt cx="1080904" cy="1080902"/>
+          </a:xfrm>
+        </p:grpSpPr>
+        <p:sp>
+          <p:nvSpPr>
+            <p:cNvPr id="9" name="Oval 8"/>
+            <p:cNvSpPr/>
+            <p:nvPr/>
+          </p:nvSpPr>
+          <p:spPr>
+            <a:xfrm>
+              <a:off x="9685338" y="4460675"/>
+              <a:ext cx="1080904" cy="1080902"/>
+            </a:xfrm>
+            <a:prstGeom prst="ellipse">
+              <a:avLst/>
+            </a:prstGeom>
+            <a:blipFill dpi="0" rotWithShape="1">
+              <a:blip r:embed="rId4">
+                <a:duotone>
+                  <a:schemeClr val="accent1">
+                    <a:shade val="45000"/>
+                    <a:satMod val="135000"/>
+                  </a:schemeClr>
+                  <a:prstClr val="white"/>
+                </a:duotone>
+                <a:extLst>
+                  <a:ext uri="{BEBA8EAE-BF5A-486C-A8C5-ECC9F3942E4B}">
+                    <a14:imgProps xmlns:a14="http://schemas.microsoft.com/office/drawing/2010/main">
+                      <a14:imgLayer r:embed="rId5">
+                        <a14:imgEffect>
+                          <a14:saturation sat="95000"/>
+                        </a14:imgEffect>
+                      </a14:imgLayer>
+                    </a14:imgProps>
+                  </a:ext>
+                </a:extLst>
+              </a:blip>
+              <a:srcRect/>
+              <a:tile tx="0" ty="0" sx="85000" sy="85000" flip="none" algn="tl"/>
+            </a:blipFill>
+            <a:ln w="25400" cap="flat" cmpd="sng" algn="ctr">
+              <a:noFill/>
+              <a:prstDash val="solid"/>
+            </a:ln>
+            <a:effectLst/>
+          </p:spPr>
+        </p:sp>
+        <p:sp>
+          <p:nvSpPr>
+            <p:cNvPr id="10" name="Oval 9"/>
+            <p:cNvSpPr/>
+            <p:nvPr/>
+          </p:nvSpPr>
+          <p:spPr>
+            <a:xfrm>
+              <a:off x="9793429" y="4568765"/>
+              <a:ext cx="864723" cy="864722"/>
+            </a:xfrm>
+            <a:prstGeom prst="ellipse">
+              <a:avLst/>
+            </a:prstGeom>
+            <a:noFill/>
+            <a:ln w="25400" cap="flat" cmpd="sng" algn="ctr">
+              <a:solidFill>
+                <a:sysClr val="window" lastClr="FFFFFF"/>
+              </a:solidFill>
+              <a:prstDash val="solid"/>
+            </a:ln>
+            <a:effectLst/>
+          </p:spPr>
+        </p:sp>
+      </p:grpSp>
       <p:sp>
         <p:nvSpPr>
           <p:cNvPr id="6" name="Slide Number Placeholder 5"/>
@@ -1053,10 +1499,19 @@
             <p:ph type="sldNum" sz="quarter" idx="12"/>
           </p:nvPr>
         </p:nvSpPr>
-        <p:spPr/>
+        <p:spPr>
+          <a:xfrm>
+            <a:off x="843702" y="2506133"/>
+            <a:ext cx="1188298" cy="720332"/>
+          </a:xfrm>
+        </p:spPr>
         <p:txBody>
           <a:bodyPr/>
-          <a:lstStyle/>
+          <a:lstStyle>
+            <a:lvl1pPr>
+              <a:defRPr sz="2800"/>
+            </a:lvl1pPr>
+          </a:lstStyle>
           <a:p>
             <a:fld id="{0D55790A-045E-46BA-99A6-A42D51CB62C6}" type="slidenum">
               <a:rPr lang="en-IN" smtClean="0"/>
@@ -1069,7 +1524,7 @@
     </p:spTree>
     <p:extLst>
       <p:ext uri="{BB962C8B-B14F-4D97-AF65-F5344CB8AC3E}">
-        <p14:creationId xmlns:p14="http://schemas.microsoft.com/office/powerpoint/2010/main" val="1088815946"/>
+        <p14:creationId xmlns:p14="http://schemas.microsoft.com/office/powerpoint/2010/main" val="431144357"/>
       </p:ext>
     </p:extLst>
   </p:cSld>
@@ -1115,7 +1570,7 @@
               <a:rPr lang="en-US" smtClean="0"/>
               <a:t>Click to edit Master title style</a:t>
             </a:r>
-            <a:endParaRPr lang="en-IN"/>
+            <a:endParaRPr lang="en-US" dirty="0"/>
           </a:p>
         </p:txBody>
       </p:sp>
@@ -1131,13 +1586,41 @@
         </p:nvSpPr>
         <p:spPr>
           <a:xfrm>
-            <a:off x="838200" y="1825625"/>
-            <a:ext cx="5181600" cy="4351338"/>
+            <a:off x="1069848" y="2194560"/>
+            <a:ext cx="4754880" cy="3977640"/>
           </a:xfrm>
         </p:spPr>
         <p:txBody>
           <a:bodyPr/>
-          <a:lstStyle/>
+          <a:lstStyle>
+            <a:lvl1pPr>
+              <a:defRPr sz="2000"/>
+            </a:lvl1pPr>
+            <a:lvl2pPr>
+              <a:defRPr sz="1800"/>
+            </a:lvl2pPr>
+            <a:lvl3pPr>
+              <a:defRPr sz="1600"/>
+            </a:lvl3pPr>
+            <a:lvl4pPr>
+              <a:defRPr sz="1600"/>
+            </a:lvl4pPr>
+            <a:lvl5pPr>
+              <a:defRPr sz="1600"/>
+            </a:lvl5pPr>
+            <a:lvl6pPr>
+              <a:defRPr sz="1600"/>
+            </a:lvl6pPr>
+            <a:lvl7pPr>
+              <a:defRPr sz="1600"/>
+            </a:lvl7pPr>
+            <a:lvl8pPr>
+              <a:defRPr sz="1600"/>
+            </a:lvl8pPr>
+            <a:lvl9pPr>
+              <a:defRPr sz="1600"/>
+            </a:lvl9pPr>
+          </a:lstStyle>
           <a:p>
             <a:pPr lvl="0"/>
             <a:r>
@@ -1172,7 +1655,7 @@
               <a:rPr lang="en-US" smtClean="0"/>
               <a:t>Fifth level</a:t>
             </a:r>
-            <a:endParaRPr lang="en-IN"/>
+            <a:endParaRPr lang="en-US" dirty="0"/>
           </a:p>
         </p:txBody>
       </p:sp>
@@ -1188,13 +1671,41 @@
         </p:nvSpPr>
         <p:spPr>
           <a:xfrm>
-            <a:off x="6172200" y="1825625"/>
-            <a:ext cx="5181600" cy="4351338"/>
+            <a:off x="6364224" y="2194560"/>
+            <a:ext cx="4754880" cy="3977640"/>
           </a:xfrm>
         </p:spPr>
         <p:txBody>
           <a:bodyPr/>
-          <a:lstStyle/>
+          <a:lstStyle>
+            <a:lvl1pPr>
+              <a:defRPr sz="2000"/>
+            </a:lvl1pPr>
+            <a:lvl2pPr>
+              <a:defRPr sz="1800"/>
+            </a:lvl2pPr>
+            <a:lvl3pPr>
+              <a:defRPr sz="1600"/>
+            </a:lvl3pPr>
+            <a:lvl4pPr>
+              <a:defRPr sz="1600"/>
+            </a:lvl4pPr>
+            <a:lvl5pPr>
+              <a:defRPr sz="1600"/>
+            </a:lvl5pPr>
+            <a:lvl6pPr>
+              <a:defRPr sz="1600"/>
+            </a:lvl6pPr>
+            <a:lvl7pPr>
+              <a:defRPr sz="1600"/>
+            </a:lvl7pPr>
+            <a:lvl8pPr>
+              <a:defRPr sz="1600"/>
+            </a:lvl8pPr>
+            <a:lvl9pPr>
+              <a:defRPr sz="1600"/>
+            </a:lvl9pPr>
+          </a:lstStyle>
           <a:p>
             <a:pPr lvl="0"/>
             <a:r>
@@ -1229,7 +1740,7 @@
               <a:rPr lang="en-US" smtClean="0"/>
               <a:t>Fifth level</a:t>
             </a:r>
-            <a:endParaRPr lang="en-IN"/>
+            <a:endParaRPr lang="en-US" dirty="0"/>
           </a:p>
         </p:txBody>
       </p:sp>
@@ -1250,7 +1761,7 @@
           <a:p>
             <a:fld id="{20BA9DDC-52D4-4332-8D45-91BD248B6AAE}" type="datetimeFigureOut">
               <a:rPr lang="en-IN" smtClean="0"/>
-              <a:t>19-06-2020</a:t>
+              <a:t>20-06-2020</a:t>
             </a:fld>
             <a:endParaRPr lang="en-IN"/>
           </a:p>
@@ -1301,7 +1812,7 @@
     </p:spTree>
     <p:extLst>
       <p:ext uri="{BB962C8B-B14F-4D97-AF65-F5344CB8AC3E}">
-        <p14:creationId xmlns:p14="http://schemas.microsoft.com/office/powerpoint/2010/main" val="895520953"/>
+        <p14:creationId xmlns:p14="http://schemas.microsoft.com/office/powerpoint/2010/main" val="1095019002"/>
       </p:ext>
     </p:extLst>
   </p:cSld>
@@ -1330,54 +1841,57 @@
       </p:grpSpPr>
       <p:sp>
         <p:nvSpPr>
-          <p:cNvPr id="2" name="Title 1"/>
+          <p:cNvPr id="10" name="Title 9"/>
           <p:cNvSpPr>
             <a:spLocks noGrp="1"/>
           </p:cNvSpPr>
           <p:nvPr>
             <p:ph type="title"/>
+          </p:nvPr>
+        </p:nvSpPr>
+        <p:spPr/>
+        <p:txBody>
+          <a:bodyPr/>
+          <a:lstStyle/>
+          <a:p>
+            <a:r>
+              <a:rPr lang="en-US" smtClean="0"/>
+              <a:t>Click to edit Master title style</a:t>
+            </a:r>
+            <a:endParaRPr lang="en-US" dirty="0"/>
+          </a:p>
+        </p:txBody>
+      </p:sp>
+      <p:sp>
+        <p:nvSpPr>
+          <p:cNvPr id="3" name="Text Placeholder 2"/>
+          <p:cNvSpPr>
+            <a:spLocks noGrp="1"/>
+          </p:cNvSpPr>
+          <p:nvPr>
+            <p:ph type="body" idx="1"/>
           </p:nvPr>
         </p:nvSpPr>
         <p:spPr>
           <a:xfrm>
-            <a:off x="839788" y="365125"/>
-            <a:ext cx="10515600" cy="1325563"/>
+            <a:off x="1066800" y="2048256"/>
+            <a:ext cx="4754880" cy="640080"/>
           </a:xfrm>
         </p:spPr>
         <p:txBody>
-          <a:bodyPr/>
-          <a:lstStyle/>
-          <a:p>
-            <a:r>
-              <a:rPr lang="en-US" smtClean="0"/>
-              <a:t>Click to edit Master title style</a:t>
-            </a:r>
-            <a:endParaRPr lang="en-IN"/>
-          </a:p>
-        </p:txBody>
-      </p:sp>
-      <p:sp>
-        <p:nvSpPr>
-          <p:cNvPr id="3" name="Text Placeholder 2"/>
-          <p:cNvSpPr>
-            <a:spLocks noGrp="1"/>
-          </p:cNvSpPr>
-          <p:nvPr>
-            <p:ph type="body" idx="1"/>
-          </p:nvPr>
-        </p:nvSpPr>
-        <p:spPr>
-          <a:xfrm>
-            <a:off x="839788" y="1681163"/>
-            <a:ext cx="5157787" cy="823912"/>
-          </a:xfrm>
-        </p:spPr>
-        <p:txBody>
-          <a:bodyPr anchor="b"/>
+          <a:bodyPr anchor="ctr">
+            <a:normAutofit/>
+          </a:bodyPr>
           <a:lstStyle>
             <a:lvl1pPr marL="0" indent="0">
               <a:buNone/>
-              <a:defRPr sz="2400" b="1"/>
+              <a:defRPr sz="2000" b="1">
+                <a:solidFill>
+                  <a:schemeClr val="accent1">
+                    <a:lumMod val="75000"/>
+                  </a:schemeClr>
+                </a:solidFill>
+              </a:defRPr>
             </a:lvl1pPr>
             <a:lvl2pPr marL="457200" indent="0">
               <a:buNone/>
@@ -1433,13 +1947,41 @@
         </p:nvSpPr>
         <p:spPr>
           <a:xfrm>
-            <a:off x="839788" y="2505075"/>
-            <a:ext cx="5157787" cy="3684588"/>
+            <a:off x="1069848" y="2743200"/>
+            <a:ext cx="4754880" cy="3291840"/>
           </a:xfrm>
         </p:spPr>
         <p:txBody>
           <a:bodyPr/>
-          <a:lstStyle/>
+          <a:lstStyle>
+            <a:lvl1pPr>
+              <a:defRPr sz="2000"/>
+            </a:lvl1pPr>
+            <a:lvl2pPr>
+              <a:defRPr sz="1800"/>
+            </a:lvl2pPr>
+            <a:lvl3pPr>
+              <a:defRPr sz="1600"/>
+            </a:lvl3pPr>
+            <a:lvl4pPr>
+              <a:defRPr sz="1600"/>
+            </a:lvl4pPr>
+            <a:lvl5pPr>
+              <a:defRPr sz="1600"/>
+            </a:lvl5pPr>
+            <a:lvl6pPr>
+              <a:defRPr sz="1600"/>
+            </a:lvl6pPr>
+            <a:lvl7pPr>
+              <a:defRPr sz="1600"/>
+            </a:lvl7pPr>
+            <a:lvl8pPr>
+              <a:defRPr sz="1600"/>
+            </a:lvl8pPr>
+            <a:lvl9pPr>
+              <a:defRPr sz="1600"/>
+            </a:lvl9pPr>
+          </a:lstStyle>
           <a:p>
             <a:pPr lvl="0"/>
             <a:r>
@@ -1474,7 +2016,7 @@
               <a:rPr lang="en-US" smtClean="0"/>
               <a:t>Fifth level</a:t>
             </a:r>
-            <a:endParaRPr lang="en-IN"/>
+            <a:endParaRPr lang="en-US" dirty="0"/>
           </a:p>
         </p:txBody>
       </p:sp>
@@ -1490,16 +2032,24 @@
         </p:nvSpPr>
         <p:spPr>
           <a:xfrm>
-            <a:off x="6172200" y="1681163"/>
-            <a:ext cx="5183188" cy="823912"/>
+            <a:off x="6364224" y="2048256"/>
+            <a:ext cx="4754880" cy="640080"/>
           </a:xfrm>
         </p:spPr>
         <p:txBody>
-          <a:bodyPr anchor="b"/>
+          <a:bodyPr anchor="ctr">
+            <a:normAutofit/>
+          </a:bodyPr>
           <a:lstStyle>
             <a:lvl1pPr marL="0" indent="0">
               <a:buNone/>
-              <a:defRPr sz="2400" b="1"/>
+              <a:defRPr sz="2000" b="1">
+                <a:solidFill>
+                  <a:schemeClr val="accent1">
+                    <a:lumMod val="75000"/>
+                  </a:schemeClr>
+                </a:solidFill>
+              </a:defRPr>
             </a:lvl1pPr>
             <a:lvl2pPr marL="457200" indent="0">
               <a:buNone/>
@@ -1555,13 +2105,41 @@
         </p:nvSpPr>
         <p:spPr>
           <a:xfrm>
-            <a:off x="6172200" y="2505075"/>
-            <a:ext cx="5183188" cy="3684588"/>
+            <a:off x="6364224" y="2743200"/>
+            <a:ext cx="4754880" cy="3291840"/>
           </a:xfrm>
         </p:spPr>
         <p:txBody>
           <a:bodyPr/>
-          <a:lstStyle/>
+          <a:lstStyle>
+            <a:lvl1pPr>
+              <a:defRPr sz="2000"/>
+            </a:lvl1pPr>
+            <a:lvl2pPr>
+              <a:defRPr sz="1800"/>
+            </a:lvl2pPr>
+            <a:lvl3pPr>
+              <a:defRPr sz="1600"/>
+            </a:lvl3pPr>
+            <a:lvl4pPr>
+              <a:defRPr sz="1600"/>
+            </a:lvl4pPr>
+            <a:lvl5pPr>
+              <a:defRPr sz="1600"/>
+            </a:lvl5pPr>
+            <a:lvl6pPr>
+              <a:defRPr sz="1600"/>
+            </a:lvl6pPr>
+            <a:lvl7pPr>
+              <a:defRPr sz="1600"/>
+            </a:lvl7pPr>
+            <a:lvl8pPr>
+              <a:defRPr sz="1600"/>
+            </a:lvl8pPr>
+            <a:lvl9pPr>
+              <a:defRPr sz="1600"/>
+            </a:lvl9pPr>
+          </a:lstStyle>
           <a:p>
             <a:pPr lvl="0"/>
             <a:r>
@@ -1596,7 +2174,7 @@
               <a:rPr lang="en-US" smtClean="0"/>
               <a:t>Fifth level</a:t>
             </a:r>
-            <a:endParaRPr lang="en-IN"/>
+            <a:endParaRPr lang="en-US" dirty="0"/>
           </a:p>
         </p:txBody>
       </p:sp>
@@ -1617,7 +2195,7 @@
           <a:p>
             <a:fld id="{20BA9DDC-52D4-4332-8D45-91BD248B6AAE}" type="datetimeFigureOut">
               <a:rPr lang="en-IN" smtClean="0"/>
-              <a:t>19-06-2020</a:t>
+              <a:t>20-06-2020</a:t>
             </a:fld>
             <a:endParaRPr lang="en-IN"/>
           </a:p>
@@ -1668,7 +2246,7 @@
     </p:spTree>
     <p:extLst>
       <p:ext uri="{BB962C8B-B14F-4D97-AF65-F5344CB8AC3E}">
-        <p14:creationId xmlns:p14="http://schemas.microsoft.com/office/powerpoint/2010/main" val="333150616"/>
+        <p14:creationId xmlns:p14="http://schemas.microsoft.com/office/powerpoint/2010/main" val="215177010"/>
       </p:ext>
     </p:extLst>
   </p:cSld>
@@ -1697,7 +2275,7 @@
       </p:grpSpPr>
       <p:sp>
         <p:nvSpPr>
-          <p:cNvPr id="2" name="Title 1"/>
+          <p:cNvPr id="6" name="Title 5"/>
           <p:cNvSpPr>
             <a:spLocks noGrp="1"/>
           </p:cNvSpPr>
@@ -1714,7 +2292,7 @@
               <a:rPr lang="en-US" smtClean="0"/>
               <a:t>Click to edit Master title style</a:t>
             </a:r>
-            <a:endParaRPr lang="en-IN"/>
+            <a:endParaRPr lang="en-US" dirty="0"/>
           </a:p>
         </p:txBody>
       </p:sp>
@@ -1735,7 +2313,7 @@
           <a:p>
             <a:fld id="{20BA9DDC-52D4-4332-8D45-91BD248B6AAE}" type="datetimeFigureOut">
               <a:rPr lang="en-IN" smtClean="0"/>
-              <a:t>19-06-2020</a:t>
+              <a:t>20-06-2020</a:t>
             </a:fld>
             <a:endParaRPr lang="en-IN"/>
           </a:p>
@@ -1786,7 +2364,7 @@
     </p:spTree>
     <p:extLst>
       <p:ext uri="{BB962C8B-B14F-4D97-AF65-F5344CB8AC3E}">
-        <p14:creationId xmlns:p14="http://schemas.microsoft.com/office/powerpoint/2010/main" val="1462360182"/>
+        <p14:creationId xmlns:p14="http://schemas.microsoft.com/office/powerpoint/2010/main" val="211710494"/>
       </p:ext>
     </p:extLst>
   </p:cSld>
@@ -1830,7 +2408,7 @@
           <a:p>
             <a:fld id="{20BA9DDC-52D4-4332-8D45-91BD248B6AAE}" type="datetimeFigureOut">
               <a:rPr lang="en-IN" smtClean="0"/>
-              <a:t>19-06-2020</a:t>
+              <a:t>20-06-2020</a:t>
             </a:fld>
             <a:endParaRPr lang="en-IN"/>
           </a:p>
@@ -1881,7 +2459,7 @@
     </p:spTree>
     <p:extLst>
       <p:ext uri="{BB962C8B-B14F-4D97-AF65-F5344CB8AC3E}">
-        <p14:creationId xmlns:p14="http://schemas.microsoft.com/office/powerpoint/2010/main" val="2714648949"/>
+        <p14:creationId xmlns:p14="http://schemas.microsoft.com/office/powerpoint/2010/main" val="2350757701"/>
       </p:ext>
     </p:extLst>
   </p:cSld>
@@ -1892,7 +2470,7 @@
 </file>
 
 <file path=ppt/slideLayouts/slideLayout8.xml><?xml version="1.0" encoding="utf-8"?>
-<p:sldLayout xmlns:a="http://schemas.openxmlformats.org/drawingml/2006/main" xmlns:r="http://schemas.openxmlformats.org/officeDocument/2006/relationships" xmlns:p="http://schemas.openxmlformats.org/presentationml/2006/main" type="objTx" preserve="1">
+<p:sldLayout xmlns:a="http://schemas.openxmlformats.org/drawingml/2006/main" xmlns:r="http://schemas.openxmlformats.org/officeDocument/2006/relationships" xmlns:p="http://schemas.openxmlformats.org/presentationml/2006/main" showMasterSp="0" type="objTx" preserve="1">
   <p:cSld name="Content with Caption">
     <p:spTree>
       <p:nvGrpSpPr>
@@ -1910,25 +2488,84 @@
       </p:grpSpPr>
       <p:sp>
         <p:nvSpPr>
-          <p:cNvPr id="2" name="Title 1"/>
-          <p:cNvSpPr>
-            <a:spLocks noGrp="1"/>
-          </p:cNvSpPr>
-          <p:nvPr>
-            <p:ph type="title"/>
-          </p:nvPr>
+          <p:cNvPr id="8" name="Rectangle 7"/>
+          <p:cNvSpPr/>
+          <p:nvPr/>
         </p:nvSpPr>
         <p:spPr>
           <a:xfrm>
-            <a:off x="839788" y="457200"/>
-            <a:ext cx="3932237" cy="1600200"/>
+            <a:off x="8303740" y="0"/>
+            <a:ext cx="3888259" cy="6857999"/>
+          </a:xfrm>
+          <a:prstGeom prst="rect">
+            <a:avLst/>
+          </a:prstGeom>
+          <a:blipFill dpi="0" rotWithShape="1">
+            <a:blip r:embed="rId2">
+              <a:alphaModFix amt="60000"/>
+              <a:lum bright="70000" contrast="-70000"/>
+              <a:extLst>
+                <a:ext uri="{BEBA8EAE-BF5A-486C-A8C5-ECC9F3942E4B}">
+                  <a14:imgProps xmlns:a14="http://schemas.microsoft.com/office/drawing/2010/main">
+                    <a14:imgLayer r:embed="rId3">
+                      <a14:imgEffect>
+                        <a14:sharpenSoften amount="61000"/>
+                      </a14:imgEffect>
+                    </a14:imgLayer>
+                  </a14:imgProps>
+                </a:ext>
+                <a:ext uri="{28A0092B-C50C-407E-A947-70E740481C1C}">
+                  <a14:useLocalDpi xmlns:a14="http://schemas.microsoft.com/office/drawing/2010/main" val="0"/>
+                </a:ext>
+              </a:extLst>
+            </a:blip>
+            <a:srcRect/>
+            <a:tile tx="0" ty="-704850" sx="92000" sy="89000" flip="xy" algn="ctr"/>
+          </a:blipFill>
+          <a:ln>
+            <a:noFill/>
+          </a:ln>
+        </p:spPr>
+        <p:style>
+          <a:lnRef idx="2">
+            <a:schemeClr val="accent1">
+              <a:shade val="50000"/>
+            </a:schemeClr>
+          </a:lnRef>
+          <a:fillRef idx="1">
+            <a:schemeClr val="accent1"/>
+          </a:fillRef>
+          <a:effectRef idx="0">
+            <a:schemeClr val="accent1"/>
+          </a:effectRef>
+          <a:fontRef idx="minor">
+            <a:schemeClr val="lt1"/>
+          </a:fontRef>
+        </p:style>
+      </p:sp>
+      <p:sp>
+        <p:nvSpPr>
+          <p:cNvPr id="2" name="Title 1"/>
+          <p:cNvSpPr>
+            <a:spLocks noGrp="1"/>
+          </p:cNvSpPr>
+          <p:nvPr>
+            <p:ph type="title"/>
+          </p:nvPr>
+        </p:nvSpPr>
+        <p:spPr>
+          <a:xfrm>
+            <a:off x="8549640" y="685800"/>
+            <a:ext cx="3200400" cy="1737360"/>
           </a:xfrm>
         </p:spPr>
         <p:txBody>
-          <a:bodyPr anchor="b"/>
+          <a:bodyPr anchor="b">
+            <a:normAutofit/>
+          </a:bodyPr>
           <a:lstStyle>
             <a:lvl1pPr>
-              <a:defRPr sz="3200"/>
+              <a:defRPr sz="3200" b="1"/>
             </a:lvl1pPr>
           </a:lstStyle>
           <a:p>
@@ -1936,7 +2573,7 @@
               <a:rPr lang="en-US" smtClean="0"/>
               <a:t>Click to edit Master title style</a:t>
             </a:r>
-            <a:endParaRPr lang="en-IN"/>
+            <a:endParaRPr lang="en-US" dirty="0"/>
           </a:p>
         </p:txBody>
       </p:sp>
@@ -1952,39 +2589,39 @@
         </p:nvSpPr>
         <p:spPr>
           <a:xfrm>
-            <a:off x="5183188" y="987425"/>
-            <a:ext cx="6172200" cy="4873625"/>
+            <a:off x="838200" y="685800"/>
+            <a:ext cx="6711696" cy="5020056"/>
           </a:xfrm>
         </p:spPr>
         <p:txBody>
           <a:bodyPr/>
           <a:lstStyle>
             <a:lvl1pPr>
-              <a:defRPr sz="3200"/>
+              <a:defRPr sz="2000"/>
             </a:lvl1pPr>
             <a:lvl2pPr>
-              <a:defRPr sz="2800"/>
+              <a:defRPr sz="1800"/>
             </a:lvl2pPr>
             <a:lvl3pPr>
-              <a:defRPr sz="2400"/>
+              <a:defRPr sz="1600"/>
             </a:lvl3pPr>
             <a:lvl4pPr>
-              <a:defRPr sz="2000"/>
+              <a:defRPr sz="1600"/>
             </a:lvl4pPr>
             <a:lvl5pPr>
-              <a:defRPr sz="2000"/>
+              <a:defRPr sz="1600"/>
             </a:lvl5pPr>
             <a:lvl6pPr>
-              <a:defRPr sz="2000"/>
+              <a:defRPr sz="1600"/>
             </a:lvl6pPr>
             <a:lvl7pPr>
-              <a:defRPr sz="2000"/>
+              <a:defRPr sz="1600"/>
             </a:lvl7pPr>
             <a:lvl8pPr>
-              <a:defRPr sz="2000"/>
+              <a:defRPr sz="1600"/>
             </a:lvl8pPr>
             <a:lvl9pPr>
-              <a:defRPr sz="2000"/>
+              <a:defRPr sz="1600"/>
             </a:lvl9pPr>
           </a:lstStyle>
           <a:p>
@@ -2021,7 +2658,7 @@
               <a:rPr lang="en-US" smtClean="0"/>
               <a:t>Fifth level</a:t>
             </a:r>
-            <a:endParaRPr lang="en-IN"/>
+            <a:endParaRPr lang="en-US" dirty="0"/>
           </a:p>
         </p:txBody>
       </p:sp>
@@ -2037,48 +2674,62 @@
         </p:nvSpPr>
         <p:spPr>
           <a:xfrm>
-            <a:off x="839788" y="2057400"/>
-            <a:ext cx="3932237" cy="3811588"/>
+            <a:off x="8549640" y="2423160"/>
+            <a:ext cx="3200400" cy="3291840"/>
           </a:xfrm>
         </p:spPr>
         <p:txBody>
-          <a:bodyPr/>
+          <a:bodyPr>
+            <a:normAutofit/>
+          </a:bodyPr>
           <a:lstStyle>
             <a:lvl1pPr marL="0" indent="0">
+              <a:lnSpc>
+                <a:spcPct val="100000"/>
+              </a:lnSpc>
+              <a:spcBef>
+                <a:spcPts val="1000"/>
+              </a:spcBef>
               <a:buNone/>
-              <a:defRPr sz="1600"/>
+              <a:defRPr sz="1400">
+                <a:solidFill>
+                  <a:schemeClr val="accent1">
+                    <a:lumMod val="75000"/>
+                  </a:schemeClr>
+                </a:solidFill>
+              </a:defRPr>
             </a:lvl1pPr>
             <a:lvl2pPr marL="457200" indent="0">
               <a:buNone/>
-              <a:defRPr sz="1400"/>
+              <a:defRPr sz="1200"/>
             </a:lvl2pPr>
             <a:lvl3pPr marL="914400" indent="0">
               <a:buNone/>
-              <a:defRPr sz="1200"/>
+              <a:defRPr sz="1000"/>
             </a:lvl3pPr>
             <a:lvl4pPr marL="1371600" indent="0">
               <a:buNone/>
-              <a:defRPr sz="1000"/>
+              <a:defRPr sz="900"/>
             </a:lvl4pPr>
             <a:lvl5pPr marL="1828800" indent="0">
               <a:buNone/>
-              <a:defRPr sz="1000"/>
+              <a:defRPr sz="900"/>
             </a:lvl5pPr>
             <a:lvl6pPr marL="2286000" indent="0">
               <a:buNone/>
-              <a:defRPr sz="1000"/>
+              <a:defRPr sz="900"/>
             </a:lvl6pPr>
             <a:lvl7pPr marL="2743200" indent="0">
               <a:buNone/>
-              <a:defRPr sz="1000"/>
+              <a:defRPr sz="900"/>
             </a:lvl7pPr>
             <a:lvl8pPr marL="3200400" indent="0">
               <a:buNone/>
-              <a:defRPr sz="1000"/>
+              <a:defRPr sz="900"/>
             </a:lvl8pPr>
             <a:lvl9pPr marL="3657600" indent="0">
               <a:buNone/>
-              <a:defRPr sz="1000"/>
+              <a:defRPr sz="900"/>
             </a:lvl9pPr>
           </a:lstStyle>
           <a:p>
@@ -2107,7 +2758,7 @@
           <a:p>
             <a:fld id="{20BA9DDC-52D4-4332-8D45-91BD248B6AAE}" type="datetimeFigureOut">
               <a:rPr lang="en-IN" smtClean="0"/>
-              <a:t>19-06-2020</a:t>
+              <a:t>20-06-2020</a:t>
             </a:fld>
             <a:endParaRPr lang="en-IN"/>
           </a:p>
@@ -2132,6 +2783,95 @@
           </a:p>
         </p:txBody>
       </p:sp>
+      <p:grpSp>
+        <p:nvGrpSpPr>
+          <p:cNvPr id="9" name="Group 8"/>
+          <p:cNvGrpSpPr>
+            <a:grpSpLocks noChangeAspect="1"/>
+          </p:cNvGrpSpPr>
+          <p:nvPr/>
+        </p:nvGrpSpPr>
+        <p:grpSpPr>
+          <a:xfrm>
+            <a:off x="11401725" y="6229681"/>
+            <a:ext cx="457200" cy="457200"/>
+            <a:chOff x="11361456" y="6195813"/>
+            <a:chExt cx="548640" cy="548640"/>
+          </a:xfrm>
+        </p:grpSpPr>
+        <p:sp>
+          <p:nvSpPr>
+            <p:cNvPr id="10" name="Oval 9"/>
+            <p:cNvSpPr/>
+            <p:nvPr/>
+          </p:nvSpPr>
+          <p:spPr>
+            <a:xfrm>
+              <a:off x="11361456" y="6195813"/>
+              <a:ext cx="548640" cy="548640"/>
+            </a:xfrm>
+            <a:prstGeom prst="ellipse">
+              <a:avLst/>
+            </a:prstGeom>
+            <a:blipFill dpi="0" rotWithShape="1">
+              <a:blip r:embed="rId4">
+                <a:duotone>
+                  <a:schemeClr val="accent1">
+                    <a:shade val="45000"/>
+                    <a:satMod val="135000"/>
+                  </a:schemeClr>
+                  <a:prstClr val="white"/>
+                </a:duotone>
+                <a:extLst>
+                  <a:ext uri="{BEBA8EAE-BF5A-486C-A8C5-ECC9F3942E4B}">
+                    <a14:imgProps xmlns:a14="http://schemas.microsoft.com/office/drawing/2010/main">
+                      <a14:imgLayer r:embed="rId5">
+                        <a14:imgEffect>
+                          <a14:saturation sat="95000"/>
+                        </a14:imgEffect>
+                        <a14:imgEffect>
+                          <a14:brightnessContrast bright="-40000" contrast="20000"/>
+                        </a14:imgEffect>
+                      </a14:imgLayer>
+                    </a14:imgProps>
+                  </a:ext>
+                </a:extLst>
+              </a:blip>
+              <a:srcRect/>
+              <a:tile tx="50800" ty="0" sx="85000" sy="85000" flip="none" algn="tl"/>
+            </a:blipFill>
+            <a:ln w="25400" cap="flat" cmpd="sng" algn="ctr">
+              <a:noFill/>
+              <a:prstDash val="solid"/>
+            </a:ln>
+            <a:effectLst/>
+          </p:spPr>
+        </p:sp>
+        <p:sp>
+          <p:nvSpPr>
+            <p:cNvPr id="11" name="Oval 10"/>
+            <p:cNvSpPr/>
+            <p:nvPr/>
+          </p:nvSpPr>
+          <p:spPr>
+            <a:xfrm>
+              <a:off x="11396488" y="6230844"/>
+              <a:ext cx="478576" cy="478578"/>
+            </a:xfrm>
+            <a:prstGeom prst="ellipse">
+              <a:avLst/>
+            </a:prstGeom>
+            <a:noFill/>
+            <a:ln w="12700" cap="flat" cmpd="sng" algn="ctr">
+              <a:solidFill>
+                <a:sysClr val="window" lastClr="FFFFFF"/>
+              </a:solidFill>
+              <a:prstDash val="solid"/>
+            </a:ln>
+            <a:effectLst/>
+          </p:spPr>
+        </p:sp>
+      </p:grpSp>
       <p:sp>
         <p:nvSpPr>
           <p:cNvPr id="7" name="Slide Number Placeholder 6"/>
@@ -2158,7 +2898,7 @@
     </p:spTree>
     <p:extLst>
       <p:ext uri="{BB962C8B-B14F-4D97-AF65-F5344CB8AC3E}">
-        <p14:creationId xmlns:p14="http://schemas.microsoft.com/office/powerpoint/2010/main" val="4092723891"/>
+        <p14:creationId xmlns:p14="http://schemas.microsoft.com/office/powerpoint/2010/main" val="2011292045"/>
       </p:ext>
     </p:extLst>
   </p:cSld>
@@ -2169,7 +2909,7 @@
 </file>
 
 <file path=ppt/slideLayouts/slideLayout9.xml><?xml version="1.0" encoding="utf-8"?>
-<p:sldLayout xmlns:a="http://schemas.openxmlformats.org/drawingml/2006/main" xmlns:r="http://schemas.openxmlformats.org/officeDocument/2006/relationships" xmlns:p="http://schemas.openxmlformats.org/presentationml/2006/main" type="picTx" preserve="1">
+<p:sldLayout xmlns:a="http://schemas.openxmlformats.org/drawingml/2006/main" xmlns:r="http://schemas.openxmlformats.org/officeDocument/2006/relationships" xmlns:p="http://schemas.openxmlformats.org/presentationml/2006/main" showMasterSp="0" type="picTx" preserve="1">
   <p:cSld name="Picture with Caption">
     <p:spTree>
       <p:nvGrpSpPr>
@@ -2187,25 +2927,84 @@
       </p:grpSpPr>
       <p:sp>
         <p:nvSpPr>
-          <p:cNvPr id="2" name="Title 1"/>
-          <p:cNvSpPr>
-            <a:spLocks noGrp="1"/>
-          </p:cNvSpPr>
-          <p:nvPr>
-            <p:ph type="title"/>
-          </p:nvPr>
+          <p:cNvPr id="11" name="Rectangle 10"/>
+          <p:cNvSpPr/>
+          <p:nvPr/>
         </p:nvSpPr>
         <p:spPr>
           <a:xfrm>
-            <a:off x="839788" y="457200"/>
-            <a:ext cx="3932237" cy="1600200"/>
+            <a:off x="8303740" y="0"/>
+            <a:ext cx="3888259" cy="6857999"/>
+          </a:xfrm>
+          <a:prstGeom prst="rect">
+            <a:avLst/>
+          </a:prstGeom>
+          <a:blipFill dpi="0" rotWithShape="1">
+            <a:blip r:embed="rId2">
+              <a:alphaModFix amt="60000"/>
+              <a:lum bright="70000" contrast="-70000"/>
+              <a:extLst>
+                <a:ext uri="{BEBA8EAE-BF5A-486C-A8C5-ECC9F3942E4B}">
+                  <a14:imgProps xmlns:a14="http://schemas.microsoft.com/office/drawing/2010/main">
+                    <a14:imgLayer r:embed="rId3">
+                      <a14:imgEffect>
+                        <a14:sharpenSoften amount="61000"/>
+                      </a14:imgEffect>
+                    </a14:imgLayer>
+                  </a14:imgProps>
+                </a:ext>
+                <a:ext uri="{28A0092B-C50C-407E-A947-70E740481C1C}">
+                  <a14:useLocalDpi xmlns:a14="http://schemas.microsoft.com/office/drawing/2010/main" val="0"/>
+                </a:ext>
+              </a:extLst>
+            </a:blip>
+            <a:srcRect/>
+            <a:tile tx="0" ty="-704850" sx="92000" sy="89000" flip="xy" algn="ctr"/>
+          </a:blipFill>
+          <a:ln>
+            <a:noFill/>
+          </a:ln>
+        </p:spPr>
+        <p:style>
+          <a:lnRef idx="2">
+            <a:schemeClr val="accent1">
+              <a:shade val="50000"/>
+            </a:schemeClr>
+          </a:lnRef>
+          <a:fillRef idx="1">
+            <a:schemeClr val="accent1"/>
+          </a:fillRef>
+          <a:effectRef idx="0">
+            <a:schemeClr val="accent1"/>
+          </a:effectRef>
+          <a:fontRef idx="minor">
+            <a:schemeClr val="lt1"/>
+          </a:fontRef>
+        </p:style>
+      </p:sp>
+      <p:sp>
+        <p:nvSpPr>
+          <p:cNvPr id="2" name="Title 1"/>
+          <p:cNvSpPr>
+            <a:spLocks noGrp="1"/>
+          </p:cNvSpPr>
+          <p:nvPr>
+            <p:ph type="title"/>
+          </p:nvPr>
+        </p:nvSpPr>
+        <p:spPr>
+          <a:xfrm>
+            <a:off x="8549640" y="685800"/>
+            <a:ext cx="3200400" cy="1737360"/>
           </a:xfrm>
         </p:spPr>
         <p:txBody>
-          <a:bodyPr anchor="b"/>
+          <a:bodyPr anchor="b">
+            <a:normAutofit/>
+          </a:bodyPr>
           <a:lstStyle>
             <a:lvl1pPr>
-              <a:defRPr sz="3200"/>
+              <a:defRPr sz="3200" b="1"/>
             </a:lvl1pPr>
           </a:lstStyle>
           <a:p>
@@ -2213,7 +3012,7 @@
               <a:rPr lang="en-US" smtClean="0"/>
               <a:t>Click to edit Master title style</a:t>
             </a:r>
-            <a:endParaRPr lang="en-IN"/>
+            <a:endParaRPr lang="en-US" dirty="0"/>
           </a:p>
         </p:txBody>
       </p:sp>
@@ -2221,7 +3020,7 @@
         <p:nvSpPr>
           <p:cNvPr id="3" name="Picture Placeholder 2"/>
           <p:cNvSpPr>
-            <a:spLocks noGrp="1"/>
+            <a:spLocks noGrp="1" noChangeAspect="1"/>
           </p:cNvSpPr>
           <p:nvPr>
             <p:ph type="pic" idx="1"/>
@@ -2229,12 +3028,18 @@
         </p:nvSpPr>
         <p:spPr>
           <a:xfrm>
-            <a:off x="5183188" y="987425"/>
-            <a:ext cx="6172200" cy="4873625"/>
+            <a:off x="0" y="0"/>
+            <a:ext cx="8303740" cy="6858000"/>
           </a:xfrm>
+          <a:solidFill>
+            <a:schemeClr val="tx2">
+              <a:lumMod val="20000"/>
+              <a:lumOff val="80000"/>
+            </a:schemeClr>
+          </a:solidFill>
         </p:spPr>
         <p:txBody>
-          <a:bodyPr/>
+          <a:bodyPr anchor="t"/>
           <a:lstStyle>
             <a:lvl1pPr marL="0" indent="0">
               <a:buNone/>
@@ -2274,7 +3079,11 @@
             </a:lvl9pPr>
           </a:lstStyle>
           <a:p>
-            <a:endParaRPr lang="en-IN"/>
+            <a:r>
+              <a:rPr lang="en-US" smtClean="0"/>
+              <a:t>Click icon to add picture</a:t>
+            </a:r>
+            <a:endParaRPr lang="en-US" dirty="0"/>
           </a:p>
         </p:txBody>
       </p:sp>
@@ -2290,48 +3099,62 @@
         </p:nvSpPr>
         <p:spPr>
           <a:xfrm>
-            <a:off x="839788" y="2057400"/>
-            <a:ext cx="3932237" cy="3811588"/>
+            <a:off x="8549640" y="2423160"/>
+            <a:ext cx="3200400" cy="3291840"/>
           </a:xfrm>
         </p:spPr>
         <p:txBody>
-          <a:bodyPr/>
+          <a:bodyPr>
+            <a:normAutofit/>
+          </a:bodyPr>
           <a:lstStyle>
             <a:lvl1pPr marL="0" indent="0">
+              <a:lnSpc>
+                <a:spcPct val="100000"/>
+              </a:lnSpc>
+              <a:spcBef>
+                <a:spcPts val="1000"/>
+              </a:spcBef>
               <a:buNone/>
-              <a:defRPr sz="1600"/>
+              <a:defRPr sz="1400">
+                <a:solidFill>
+                  <a:schemeClr val="accent1">
+                    <a:lumMod val="75000"/>
+                  </a:schemeClr>
+                </a:solidFill>
+              </a:defRPr>
             </a:lvl1pPr>
             <a:lvl2pPr marL="457200" indent="0">
               <a:buNone/>
-              <a:defRPr sz="1400"/>
+              <a:defRPr sz="1200"/>
             </a:lvl2pPr>
             <a:lvl3pPr marL="914400" indent="0">
               <a:buNone/>
-              <a:defRPr sz="1200"/>
+              <a:defRPr sz="1000"/>
             </a:lvl3pPr>
             <a:lvl4pPr marL="1371600" indent="0">
               <a:buNone/>
-              <a:defRPr sz="1000"/>
+              <a:defRPr sz="900"/>
             </a:lvl4pPr>
             <a:lvl5pPr marL="1828800" indent="0">
               <a:buNone/>
-              <a:defRPr sz="1000"/>
+              <a:defRPr sz="900"/>
             </a:lvl5pPr>
             <a:lvl6pPr marL="2286000" indent="0">
               <a:buNone/>
-              <a:defRPr sz="1000"/>
+              <a:defRPr sz="900"/>
             </a:lvl6pPr>
             <a:lvl7pPr marL="2743200" indent="0">
               <a:buNone/>
-              <a:defRPr sz="1000"/>
+              <a:defRPr sz="900"/>
             </a:lvl7pPr>
             <a:lvl8pPr marL="3200400" indent="0">
               <a:buNone/>
-              <a:defRPr sz="1000"/>
+              <a:defRPr sz="900"/>
             </a:lvl8pPr>
             <a:lvl9pPr marL="3657600" indent="0">
               <a:buNone/>
-              <a:defRPr sz="1000"/>
+              <a:defRPr sz="900"/>
             </a:lvl9pPr>
           </a:lstStyle>
           <a:p>
@@ -2360,31 +3183,101 @@
           <a:p>
             <a:fld id="{20BA9DDC-52D4-4332-8D45-91BD248B6AAE}" type="datetimeFigureOut">
               <a:rPr lang="en-IN" smtClean="0"/>
-              <a:t>19-06-2020</a:t>
+              <a:t>20-06-2020</a:t>
             </a:fld>
             <a:endParaRPr lang="en-IN"/>
           </a:p>
         </p:txBody>
       </p:sp>
-      <p:sp>
-        <p:nvSpPr>
-          <p:cNvPr id="6" name="Footer Placeholder 5"/>
-          <p:cNvSpPr>
-            <a:spLocks noGrp="1"/>
-          </p:cNvSpPr>
-          <p:nvPr>
-            <p:ph type="ftr" sz="quarter" idx="11"/>
-          </p:nvPr>
-        </p:nvSpPr>
-        <p:spPr/>
-        <p:txBody>
-          <a:bodyPr/>
-          <a:lstStyle/>
-          <a:p>
-            <a:endParaRPr lang="en-IN"/>
-          </a:p>
-        </p:txBody>
-      </p:sp>
+      <p:grpSp>
+        <p:nvGrpSpPr>
+          <p:cNvPr id="8" name="Group 7"/>
+          <p:cNvGrpSpPr>
+            <a:grpSpLocks noChangeAspect="1"/>
+          </p:cNvGrpSpPr>
+          <p:nvPr/>
+        </p:nvGrpSpPr>
+        <p:grpSpPr>
+          <a:xfrm>
+            <a:off x="11401725" y="6229681"/>
+            <a:ext cx="457200" cy="457200"/>
+            <a:chOff x="11361456" y="6195813"/>
+            <a:chExt cx="548640" cy="548640"/>
+          </a:xfrm>
+        </p:grpSpPr>
+        <p:sp>
+          <p:nvSpPr>
+            <p:cNvPr id="9" name="Oval 8"/>
+            <p:cNvSpPr/>
+            <p:nvPr/>
+          </p:nvSpPr>
+          <p:spPr>
+            <a:xfrm>
+              <a:off x="11361456" y="6195813"/>
+              <a:ext cx="548640" cy="548640"/>
+            </a:xfrm>
+            <a:prstGeom prst="ellipse">
+              <a:avLst/>
+            </a:prstGeom>
+            <a:blipFill dpi="0" rotWithShape="1">
+              <a:blip r:embed="rId4">
+                <a:duotone>
+                  <a:schemeClr val="accent1">
+                    <a:shade val="45000"/>
+                    <a:satMod val="135000"/>
+                  </a:schemeClr>
+                  <a:prstClr val="white"/>
+                </a:duotone>
+                <a:extLst>
+                  <a:ext uri="{BEBA8EAE-BF5A-486C-A8C5-ECC9F3942E4B}">
+                    <a14:imgProps xmlns:a14="http://schemas.microsoft.com/office/drawing/2010/main">
+                      <a14:imgLayer r:embed="rId5">
+                        <a14:imgEffect>
+                          <a14:saturation sat="95000"/>
+                        </a14:imgEffect>
+                        <a14:imgEffect>
+                          <a14:brightnessContrast bright="-40000" contrast="20000"/>
+                        </a14:imgEffect>
+                      </a14:imgLayer>
+                    </a14:imgProps>
+                  </a:ext>
+                </a:extLst>
+              </a:blip>
+              <a:srcRect/>
+              <a:tile tx="50800" ty="0" sx="85000" sy="85000" flip="none" algn="tl"/>
+            </a:blipFill>
+            <a:ln w="25400" cap="flat" cmpd="sng" algn="ctr">
+              <a:noFill/>
+              <a:prstDash val="solid"/>
+            </a:ln>
+            <a:effectLst/>
+          </p:spPr>
+        </p:sp>
+        <p:sp>
+          <p:nvSpPr>
+            <p:cNvPr id="10" name="Oval 9"/>
+            <p:cNvSpPr/>
+            <p:nvPr/>
+          </p:nvSpPr>
+          <p:spPr>
+            <a:xfrm>
+              <a:off x="11396488" y="6230844"/>
+              <a:ext cx="478576" cy="478578"/>
+            </a:xfrm>
+            <a:prstGeom prst="ellipse">
+              <a:avLst/>
+            </a:prstGeom>
+            <a:noFill/>
+            <a:ln w="12700" cap="flat" cmpd="sng" algn="ctr">
+              <a:solidFill>
+                <a:sysClr val="window" lastClr="FFFFFF"/>
+              </a:solidFill>
+              <a:prstDash val="solid"/>
+            </a:ln>
+            <a:effectLst/>
+          </p:spPr>
+        </p:sp>
+      </p:grpSp>
       <p:sp>
         <p:nvSpPr>
           <p:cNvPr id="7" name="Slide Number Placeholder 6"/>
@@ -2411,7 +3304,7 @@
     </p:spTree>
     <p:extLst>
       <p:ext uri="{BB962C8B-B14F-4D97-AF65-F5344CB8AC3E}">
-        <p14:creationId xmlns:p14="http://schemas.microsoft.com/office/powerpoint/2010/main" val="463338468"/>
+        <p14:creationId xmlns:p14="http://schemas.microsoft.com/office/powerpoint/2010/main" val="994296380"/>
       </p:ext>
     </p:extLst>
   </p:cSld>
@@ -2455,8 +3348,8 @@
         </p:nvSpPr>
         <p:spPr>
           <a:xfrm>
-            <a:off x="838200" y="365125"/>
-            <a:ext cx="10515600" cy="1325563"/>
+            <a:off x="1069848" y="484632"/>
+            <a:ext cx="10058400" cy="1609344"/>
           </a:xfrm>
           <a:prstGeom prst="rect">
             <a:avLst/>
@@ -2472,7 +3365,7 @@
               <a:rPr lang="en-US" smtClean="0"/>
               <a:t>Click to edit Master title style</a:t>
             </a:r>
-            <a:endParaRPr lang="en-IN"/>
+            <a:endParaRPr lang="en-US" dirty="0"/>
           </a:p>
         </p:txBody>
       </p:sp>
@@ -2488,8 +3381,8 @@
         </p:nvSpPr>
         <p:spPr>
           <a:xfrm>
-            <a:off x="838200" y="1825625"/>
-            <a:ext cx="10515600" cy="4351338"/>
+            <a:off x="1069848" y="2121408"/>
+            <a:ext cx="10058400" cy="4050792"/>
           </a:xfrm>
           <a:prstGeom prst="rect">
             <a:avLst/>
@@ -2534,7 +3427,7 @@
               <a:rPr lang="en-US" smtClean="0"/>
               <a:t>Fifth level</a:t>
             </a:r>
-            <a:endParaRPr lang="en-IN"/>
+            <a:endParaRPr lang="en-US" dirty="0"/>
           </a:p>
         </p:txBody>
       </p:sp>
@@ -2550,8 +3443,8 @@
         </p:nvSpPr>
         <p:spPr>
           <a:xfrm>
-            <a:off x="838200" y="6356350"/>
-            <a:ext cx="2743200" cy="365125"/>
+            <a:off x="7964424" y="6272784"/>
+            <a:ext cx="3273552" cy="365125"/>
           </a:xfrm>
           <a:prstGeom prst="rect">
             <a:avLst/>
@@ -2560,12 +3453,10 @@
         <p:txBody>
           <a:bodyPr vert="horz" lIns="91440" tIns="45720" rIns="91440" bIns="45720" rtlCol="0" anchor="ctr"/>
           <a:lstStyle>
-            <a:lvl1pPr algn="l">
-              <a:defRPr sz="1200">
+            <a:lvl1pPr algn="r">
+              <a:defRPr sz="1100">
                 <a:solidFill>
-                  <a:schemeClr val="tx1">
-                    <a:tint val="75000"/>
-                  </a:schemeClr>
+                  <a:schemeClr val="tx2"/>
                 </a:solidFill>
               </a:defRPr>
             </a:lvl1pPr>
@@ -2573,7 +3464,7 @@
           <a:p>
             <a:fld id="{20BA9DDC-52D4-4332-8D45-91BD248B6AAE}" type="datetimeFigureOut">
               <a:rPr lang="en-IN" smtClean="0"/>
-              <a:t>19-06-2020</a:t>
+              <a:t>20-06-2020</a:t>
             </a:fld>
             <a:endParaRPr lang="en-IN"/>
           </a:p>
@@ -2591,8 +3482,8 @@
         </p:nvSpPr>
         <p:spPr>
           <a:xfrm>
-            <a:off x="4038600" y="6356350"/>
-            <a:ext cx="4114800" cy="365125"/>
+            <a:off x="1088136" y="6272784"/>
+            <a:ext cx="6327648" cy="365125"/>
           </a:xfrm>
           <a:prstGeom prst="rect">
             <a:avLst/>
@@ -2601,12 +3492,10 @@
         <p:txBody>
           <a:bodyPr vert="horz" lIns="91440" tIns="45720" rIns="91440" bIns="45720" rtlCol="0" anchor="ctr"/>
           <a:lstStyle>
-            <a:lvl1pPr algn="ctr">
-              <a:defRPr sz="1200">
+            <a:lvl1pPr algn="l">
+              <a:defRPr sz="1100">
                 <a:solidFill>
-                  <a:schemeClr val="tx1">
-                    <a:tint val="75000"/>
-                  </a:schemeClr>
+                  <a:schemeClr val="tx2"/>
                 </a:solidFill>
               </a:defRPr>
             </a:lvl1pPr>
@@ -2616,6 +3505,95 @@
           </a:p>
         </p:txBody>
       </p:sp>
+      <p:grpSp>
+        <p:nvGrpSpPr>
+          <p:cNvPr id="7" name="Group 6"/>
+          <p:cNvGrpSpPr>
+            <a:grpSpLocks noChangeAspect="1"/>
+          </p:cNvGrpSpPr>
+          <p:nvPr/>
+        </p:nvGrpSpPr>
+        <p:grpSpPr>
+          <a:xfrm>
+            <a:off x="11401725" y="6229681"/>
+            <a:ext cx="457200" cy="457200"/>
+            <a:chOff x="11361456" y="6195813"/>
+            <a:chExt cx="548640" cy="548640"/>
+          </a:xfrm>
+        </p:grpSpPr>
+        <p:sp>
+          <p:nvSpPr>
+            <p:cNvPr id="8" name="Oval 7"/>
+            <p:cNvSpPr/>
+            <p:nvPr/>
+          </p:nvSpPr>
+          <p:spPr>
+            <a:xfrm>
+              <a:off x="11361456" y="6195813"/>
+              <a:ext cx="548640" cy="548640"/>
+            </a:xfrm>
+            <a:prstGeom prst="ellipse">
+              <a:avLst/>
+            </a:prstGeom>
+            <a:blipFill dpi="0" rotWithShape="1">
+              <a:blip r:embed="rId13">
+                <a:duotone>
+                  <a:schemeClr val="accent1">
+                    <a:shade val="45000"/>
+                    <a:satMod val="135000"/>
+                  </a:schemeClr>
+                  <a:prstClr val="white"/>
+                </a:duotone>
+                <a:extLst>
+                  <a:ext uri="{BEBA8EAE-BF5A-486C-A8C5-ECC9F3942E4B}">
+                    <a14:imgProps xmlns:a14="http://schemas.microsoft.com/office/drawing/2010/main">
+                      <a14:imgLayer r:embed="rId14">
+                        <a14:imgEffect>
+                          <a14:saturation sat="95000"/>
+                        </a14:imgEffect>
+                        <a14:imgEffect>
+                          <a14:brightnessContrast bright="-40000" contrast="20000"/>
+                        </a14:imgEffect>
+                      </a14:imgLayer>
+                    </a14:imgProps>
+                  </a:ext>
+                </a:extLst>
+              </a:blip>
+              <a:srcRect/>
+              <a:tile tx="50800" ty="0" sx="85000" sy="85000" flip="none" algn="tl"/>
+            </a:blipFill>
+            <a:ln w="25400" cap="flat" cmpd="sng" algn="ctr">
+              <a:noFill/>
+              <a:prstDash val="solid"/>
+            </a:ln>
+            <a:effectLst/>
+          </p:spPr>
+        </p:sp>
+        <p:sp>
+          <p:nvSpPr>
+            <p:cNvPr id="9" name="Oval 8"/>
+            <p:cNvSpPr/>
+            <p:nvPr/>
+          </p:nvSpPr>
+          <p:spPr>
+            <a:xfrm>
+              <a:off x="11396488" y="6230844"/>
+              <a:ext cx="478576" cy="478578"/>
+            </a:xfrm>
+            <a:prstGeom prst="ellipse">
+              <a:avLst/>
+            </a:prstGeom>
+            <a:noFill/>
+            <a:ln w="12700" cap="flat" cmpd="sng" algn="ctr">
+              <a:solidFill>
+                <a:srgbClr val="FFFFFF"/>
+              </a:solidFill>
+              <a:prstDash val="solid"/>
+            </a:ln>
+            <a:effectLst/>
+          </p:spPr>
+        </p:sp>
+      </p:grpSp>
       <p:sp>
         <p:nvSpPr>
           <p:cNvPr id="6" name="Slide Number Placeholder 5"/>
@@ -2628,8 +3606,8 @@
         </p:nvSpPr>
         <p:spPr>
           <a:xfrm>
-            <a:off x="8610600" y="6356350"/>
-            <a:ext cx="2743200" cy="365125"/>
+            <a:off x="11311128" y="6272784"/>
+            <a:ext cx="640080" cy="365125"/>
           </a:xfrm>
           <a:prstGeom prst="rect">
             <a:avLst/>
@@ -2638,13 +3616,12 @@
         <p:txBody>
           <a:bodyPr vert="horz" lIns="91440" tIns="45720" rIns="91440" bIns="45720" rtlCol="0" anchor="ctr"/>
           <a:lstStyle>
-            <a:lvl1pPr algn="r">
-              <a:defRPr sz="1200">
+            <a:lvl1pPr algn="ctr">
+              <a:defRPr sz="1400" b="1">
                 <a:solidFill>
-                  <a:schemeClr val="tx1">
-                    <a:tint val="75000"/>
-                  </a:schemeClr>
+                  <a:srgbClr val="FFFFFF"/>
                 </a:solidFill>
+                <a:latin typeface="+mj-lt"/>
               </a:defRPr>
             </a:lvl1pPr>
           </a:lstStyle>
@@ -2660,23 +3637,23 @@
     </p:spTree>
     <p:extLst>
       <p:ext uri="{BB962C8B-B14F-4D97-AF65-F5344CB8AC3E}">
-        <p14:creationId xmlns:p14="http://schemas.microsoft.com/office/powerpoint/2010/main" val="270844376"/>
+        <p14:creationId xmlns:p14="http://schemas.microsoft.com/office/powerpoint/2010/main" val="3056804606"/>
       </p:ext>
     </p:extLst>
   </p:cSld>
   <p:clrMap bg1="lt1" tx1="dk1" bg2="lt2" tx2="dk2" accent1="accent1" accent2="accent2" accent3="accent3" accent4="accent4" accent5="accent5" accent6="accent6" hlink="hlink" folHlink="folHlink"/>
   <p:sldLayoutIdLst>
-    <p:sldLayoutId id="2147483791" r:id="rId1"/>
-    <p:sldLayoutId id="2147483792" r:id="rId2"/>
-    <p:sldLayoutId id="2147483793" r:id="rId3"/>
-    <p:sldLayoutId id="2147483794" r:id="rId4"/>
-    <p:sldLayoutId id="2147483795" r:id="rId5"/>
-    <p:sldLayoutId id="2147483796" r:id="rId6"/>
-    <p:sldLayoutId id="2147483797" r:id="rId7"/>
-    <p:sldLayoutId id="2147483798" r:id="rId8"/>
-    <p:sldLayoutId id="2147483799" r:id="rId9"/>
-    <p:sldLayoutId id="2147483800" r:id="rId10"/>
-    <p:sldLayoutId id="2147483801" r:id="rId11"/>
+    <p:sldLayoutId id="2147483832" r:id="rId1"/>
+    <p:sldLayoutId id="2147483833" r:id="rId2"/>
+    <p:sldLayoutId id="2147483834" r:id="rId3"/>
+    <p:sldLayoutId id="2147483835" r:id="rId4"/>
+    <p:sldLayoutId id="2147483836" r:id="rId5"/>
+    <p:sldLayoutId id="2147483837" r:id="rId6"/>
+    <p:sldLayoutId id="2147483838" r:id="rId7"/>
+    <p:sldLayoutId id="2147483839" r:id="rId8"/>
+    <p:sldLayoutId id="2147483840" r:id="rId9"/>
+    <p:sldLayoutId id="2147483841" r:id="rId10"/>
+    <p:sldLayoutId id="2147483842" r:id="rId11"/>
   </p:sldLayoutIdLst>
   <p:txStyles>
     <p:titleStyle>
@@ -2688,10 +3665,17 @@
           <a:spcPct val="0"/>
         </a:spcBef>
         <a:buNone/>
-        <a:defRPr sz="4400" kern="1200">
-          <a:solidFill>
-            <a:schemeClr val="tx1"/>
-          </a:solidFill>
+        <a:defRPr sz="5400" kern="1200" cap="all" baseline="0">
+          <a:blipFill>
+            <a:blip r:embed="rId15">
+              <a:extLst>
+                <a:ext uri="{28A0092B-C50C-407E-A947-70E740481C1C}">
+                  <a14:useLocalDpi xmlns:a14="http://schemas.microsoft.com/office/drawing/2010/main" val="0"/>
+                </a:ext>
+              </a:extLst>
+            </a:blip>
+            <a:tile tx="6350" ty="-127000" sx="65000" sy="64000" flip="none" algn="tl"/>
+          </a:blipFill>
           <a:latin typeface="+mj-lt"/>
           <a:ea typeface="+mj-ea"/>
           <a:cs typeface="+mj-cs"/>
@@ -2699,16 +3683,22 @@
       </a:lvl1pPr>
     </p:titleStyle>
     <p:bodyStyle>
-      <a:lvl1pPr marL="228600" indent="-228600" algn="l" defTabSz="914400" rtl="0" eaLnBrk="1" latinLnBrk="0" hangingPunct="1">
+      <a:lvl1pPr marL="182880" indent="-182880" algn="l" defTabSz="914400" rtl="0" eaLnBrk="1" latinLnBrk="0" hangingPunct="1">
         <a:lnSpc>
           <a:spcPct val="90000"/>
         </a:lnSpc>
         <a:spcBef>
-          <a:spcPts val="1000"/>
+          <a:spcPts val="1200"/>
         </a:spcBef>
-        <a:buFont typeface="Arial" panose="020B0604020202020204" pitchFamily="34" charset="0"/>
-        <a:buChar char="•"/>
-        <a:defRPr sz="2800" kern="1200">
+        <a:buClr>
+          <a:schemeClr val="accent1">
+            <a:lumMod val="75000"/>
+          </a:schemeClr>
+        </a:buClr>
+        <a:buSzPct val="85000"/>
+        <a:buFont typeface="Wingdings" pitchFamily="2" charset="2"/>
+        <a:buChar char="§"/>
+        <a:defRPr sz="2000" kern="1200">
           <a:solidFill>
             <a:schemeClr val="tx1"/>
           </a:solidFill>
@@ -2717,16 +3707,25 @@
           <a:cs typeface="+mn-cs"/>
         </a:defRPr>
       </a:lvl1pPr>
-      <a:lvl2pPr marL="685800" indent="-228600" algn="l" defTabSz="914400" rtl="0" eaLnBrk="1" latinLnBrk="0" hangingPunct="1">
+      <a:lvl2pPr marL="457200" indent="-182880" algn="l" defTabSz="914400" rtl="0" eaLnBrk="1" latinLnBrk="0" hangingPunct="1">
         <a:lnSpc>
           <a:spcPct val="90000"/>
         </a:lnSpc>
         <a:spcBef>
-          <a:spcPts val="500"/>
+          <a:spcPts val="400"/>
         </a:spcBef>
-        <a:buFont typeface="Arial" panose="020B0604020202020204" pitchFamily="34" charset="0"/>
-        <a:buChar char="•"/>
-        <a:defRPr sz="2400" kern="1200">
+        <a:spcAft>
+          <a:spcPts val="200"/>
+        </a:spcAft>
+        <a:buClr>
+          <a:schemeClr val="accent1">
+            <a:lumMod val="75000"/>
+          </a:schemeClr>
+        </a:buClr>
+        <a:buSzPct val="85000"/>
+        <a:buFont typeface="Wingdings" pitchFamily="2" charset="2"/>
+        <a:buChar char="§"/>
+        <a:defRPr sz="1800" kern="1200">
           <a:solidFill>
             <a:schemeClr val="tx1"/>
           </a:solidFill>
@@ -2735,16 +3734,25 @@
           <a:cs typeface="+mn-cs"/>
         </a:defRPr>
       </a:lvl2pPr>
-      <a:lvl3pPr marL="1143000" indent="-228600" algn="l" defTabSz="914400" rtl="0" eaLnBrk="1" latinLnBrk="0" hangingPunct="1">
+      <a:lvl3pPr marL="731520" indent="-182880" algn="l" defTabSz="914400" rtl="0" eaLnBrk="1" latinLnBrk="0" hangingPunct="1">
         <a:lnSpc>
           <a:spcPct val="90000"/>
         </a:lnSpc>
         <a:spcBef>
-          <a:spcPts val="500"/>
+          <a:spcPts val="400"/>
         </a:spcBef>
-        <a:buFont typeface="Arial" panose="020B0604020202020204" pitchFamily="34" charset="0"/>
-        <a:buChar char="•"/>
-        <a:defRPr sz="2000" kern="1200">
+        <a:spcAft>
+          <a:spcPts val="200"/>
+        </a:spcAft>
+        <a:buClr>
+          <a:schemeClr val="accent1">
+            <a:lumMod val="75000"/>
+          </a:schemeClr>
+        </a:buClr>
+        <a:buSzPct val="85000"/>
+        <a:buFont typeface="Wingdings" pitchFamily="2" charset="2"/>
+        <a:buChar char="§"/>
+        <a:defRPr sz="1600" kern="1200">
           <a:solidFill>
             <a:schemeClr val="tx1"/>
           </a:solidFill>
@@ -2753,16 +3761,25 @@
           <a:cs typeface="+mn-cs"/>
         </a:defRPr>
       </a:lvl3pPr>
-      <a:lvl4pPr marL="1600200" indent="-228600" algn="l" defTabSz="914400" rtl="0" eaLnBrk="1" latinLnBrk="0" hangingPunct="1">
+      <a:lvl4pPr marL="1005840" indent="-182880" algn="l" defTabSz="914400" rtl="0" eaLnBrk="1" latinLnBrk="0" hangingPunct="1">
         <a:lnSpc>
           <a:spcPct val="90000"/>
         </a:lnSpc>
         <a:spcBef>
-          <a:spcPts val="500"/>
+          <a:spcPts val="400"/>
         </a:spcBef>
-        <a:buFont typeface="Arial" panose="020B0604020202020204" pitchFamily="34" charset="0"/>
-        <a:buChar char="•"/>
-        <a:defRPr sz="1800" kern="1200">
+        <a:spcAft>
+          <a:spcPts val="200"/>
+        </a:spcAft>
+        <a:buClr>
+          <a:schemeClr val="accent1">
+            <a:lumMod val="75000"/>
+          </a:schemeClr>
+        </a:buClr>
+        <a:buSzPct val="85000"/>
+        <a:buFont typeface="Wingdings" pitchFamily="2" charset="2"/>
+        <a:buChar char="§"/>
+        <a:defRPr sz="1600" kern="1200">
           <a:solidFill>
             <a:schemeClr val="tx1"/>
           </a:solidFill>
@@ -2771,16 +3788,25 @@
           <a:cs typeface="+mn-cs"/>
         </a:defRPr>
       </a:lvl4pPr>
-      <a:lvl5pPr marL="2057400" indent="-228600" algn="l" defTabSz="914400" rtl="0" eaLnBrk="1" latinLnBrk="0" hangingPunct="1">
+      <a:lvl5pPr marL="1280160" indent="-182880" algn="l" defTabSz="914400" rtl="0" eaLnBrk="1" latinLnBrk="0" hangingPunct="1">
         <a:lnSpc>
           <a:spcPct val="90000"/>
         </a:lnSpc>
         <a:spcBef>
-          <a:spcPts val="500"/>
+          <a:spcPts val="400"/>
         </a:spcBef>
-        <a:buFont typeface="Arial" panose="020B0604020202020204" pitchFamily="34" charset="0"/>
-        <a:buChar char="•"/>
-        <a:defRPr sz="1800" kern="1200">
+        <a:spcAft>
+          <a:spcPts val="200"/>
+        </a:spcAft>
+        <a:buClr>
+          <a:schemeClr val="accent1">
+            <a:lumMod val="75000"/>
+          </a:schemeClr>
+        </a:buClr>
+        <a:buSzPct val="85000"/>
+        <a:buFont typeface="Wingdings" pitchFamily="2" charset="2"/>
+        <a:buChar char="§"/>
+        <a:defRPr sz="1600" kern="1200">
           <a:solidFill>
             <a:schemeClr val="tx1"/>
           </a:solidFill>
@@ -2789,16 +3815,25 @@
           <a:cs typeface="+mn-cs"/>
         </a:defRPr>
       </a:lvl5pPr>
-      <a:lvl6pPr marL="2514600" indent="-228600" algn="l" defTabSz="914400" rtl="0" eaLnBrk="1" latinLnBrk="0" hangingPunct="1">
+      <a:lvl6pPr marL="1600000" indent="-228600" algn="l" defTabSz="914400" rtl="0" eaLnBrk="1" latinLnBrk="0" hangingPunct="1">
         <a:lnSpc>
           <a:spcPct val="90000"/>
         </a:lnSpc>
         <a:spcBef>
-          <a:spcPts val="500"/>
+          <a:spcPts val="400"/>
         </a:spcBef>
-        <a:buFont typeface="Arial" panose="020B0604020202020204" pitchFamily="34" charset="0"/>
-        <a:buChar char="•"/>
-        <a:defRPr sz="1800" kern="1200">
+        <a:spcAft>
+          <a:spcPts val="200"/>
+        </a:spcAft>
+        <a:buClr>
+          <a:schemeClr val="accent1">
+            <a:lumMod val="75000"/>
+          </a:schemeClr>
+        </a:buClr>
+        <a:buSzPct val="85000"/>
+        <a:buFont typeface="Wingdings" pitchFamily="2" charset="2"/>
+        <a:buChar char="§"/>
+        <a:defRPr sz="1600" kern="1200">
           <a:solidFill>
             <a:schemeClr val="tx1"/>
           </a:solidFill>
@@ -2807,16 +3842,25 @@
           <a:cs typeface="+mn-cs"/>
         </a:defRPr>
       </a:lvl6pPr>
-      <a:lvl7pPr marL="2971800" indent="-228600" algn="l" defTabSz="914400" rtl="0" eaLnBrk="1" latinLnBrk="0" hangingPunct="1">
+      <a:lvl7pPr marL="1900000" indent="-228600" algn="l" defTabSz="914400" rtl="0" eaLnBrk="1" latinLnBrk="0" hangingPunct="1">
         <a:lnSpc>
           <a:spcPct val="90000"/>
         </a:lnSpc>
         <a:spcBef>
-          <a:spcPts val="500"/>
+          <a:spcPts val="400"/>
         </a:spcBef>
-        <a:buFont typeface="Arial" panose="020B0604020202020204" pitchFamily="34" charset="0"/>
-        <a:buChar char="•"/>
-        <a:defRPr sz="1800" kern="1200">
+        <a:spcAft>
+          <a:spcPts val="200"/>
+        </a:spcAft>
+        <a:buClr>
+          <a:schemeClr val="accent1">
+            <a:lumMod val="75000"/>
+          </a:schemeClr>
+        </a:buClr>
+        <a:buSzPct val="85000"/>
+        <a:buFont typeface="Wingdings" pitchFamily="2" charset="2"/>
+        <a:buChar char="§"/>
+        <a:defRPr sz="1600" kern="1200">
           <a:solidFill>
             <a:schemeClr val="tx1"/>
           </a:solidFill>
@@ -2825,16 +3869,25 @@
           <a:cs typeface="+mn-cs"/>
         </a:defRPr>
       </a:lvl7pPr>
-      <a:lvl8pPr marL="3429000" indent="-228600" algn="l" defTabSz="914400" rtl="0" eaLnBrk="1" latinLnBrk="0" hangingPunct="1">
+      <a:lvl8pPr marL="2200000" indent="-228600" algn="l" defTabSz="914400" rtl="0" eaLnBrk="1" latinLnBrk="0" hangingPunct="1">
         <a:lnSpc>
           <a:spcPct val="90000"/>
         </a:lnSpc>
         <a:spcBef>
-          <a:spcPts val="500"/>
+          <a:spcPts val="400"/>
         </a:spcBef>
-        <a:buFont typeface="Arial" panose="020B0604020202020204" pitchFamily="34" charset="0"/>
-        <a:buChar char="•"/>
-        <a:defRPr sz="1800" kern="1200">
+        <a:spcAft>
+          <a:spcPts val="200"/>
+        </a:spcAft>
+        <a:buClr>
+          <a:schemeClr val="accent1">
+            <a:lumMod val="75000"/>
+          </a:schemeClr>
+        </a:buClr>
+        <a:buSzPct val="85000"/>
+        <a:buFont typeface="Wingdings" pitchFamily="2" charset="2"/>
+        <a:buChar char="§"/>
+        <a:defRPr sz="1600" kern="1200">
           <a:solidFill>
             <a:schemeClr val="tx1"/>
           </a:solidFill>
@@ -2843,16 +3896,25 @@
           <a:cs typeface="+mn-cs"/>
         </a:defRPr>
       </a:lvl8pPr>
-      <a:lvl9pPr marL="3886200" indent="-228600" algn="l" defTabSz="914400" rtl="0" eaLnBrk="1" latinLnBrk="0" hangingPunct="1">
+      <a:lvl9pPr marL="2500000" indent="-228600" algn="l" defTabSz="914400" rtl="0" eaLnBrk="1" latinLnBrk="0" hangingPunct="1">
         <a:lnSpc>
           <a:spcPct val="90000"/>
         </a:lnSpc>
         <a:spcBef>
-          <a:spcPts val="500"/>
+          <a:spcPts val="400"/>
         </a:spcBef>
-        <a:buFont typeface="Arial" panose="020B0604020202020204" pitchFamily="34" charset="0"/>
-        <a:buChar char="•"/>
-        <a:defRPr sz="1800" kern="1200">
+        <a:spcAft>
+          <a:spcPts val="200"/>
+        </a:spcAft>
+        <a:buClr>
+          <a:schemeClr val="accent1">
+            <a:lumMod val="75000"/>
+          </a:schemeClr>
+        </a:buClr>
+        <a:buSzPct val="85000"/>
+        <a:buFont typeface="Wingdings" pitchFamily="2" charset="2"/>
+        <a:buChar char="§"/>
+        <a:defRPr sz="1600" kern="1200">
           <a:solidFill>
             <a:schemeClr val="tx1"/>
           </a:solidFill>
@@ -2994,10 +4056,14 @@
           <a:lstStyle/>
           <a:p>
             <a:r>
-              <a:rPr lang="en-US" dirty="0" smtClean="0"/>
-              <a:t>Unit test</a:t>
-            </a:r>
-            <a:endParaRPr lang="en-IN" dirty="0"/>
+              <a:rPr lang="en-GB" dirty="0"/>
+              <a:t>Unit </a:t>
+            </a:r>
+            <a:r>
+              <a:rPr lang="en-GB" dirty="0" smtClean="0"/>
+              <a:t>testing</a:t>
+            </a:r>
+            <a:endParaRPr lang="en-GB" dirty="0"/>
           </a:p>
         </p:txBody>
       </p:sp>
@@ -3072,10 +4138,6 @@
           <a:bodyPr/>
           <a:lstStyle/>
           <a:p>
-            <a:r>
-              <a:rPr lang="en-US" dirty="0" smtClean="0"/>
-              <a:t>TDD is easier than I thought</a:t>
-            </a:r>
             <a:endParaRPr lang="en-IN" dirty="0"/>
           </a:p>
         </p:txBody>
@@ -3095,55 +4157,42 @@
           <a:bodyPr/>
           <a:lstStyle/>
           <a:p>
+            <a:r>
+              <a:rPr lang="en-US" dirty="0" smtClean="0"/>
+              <a:t>It’s a situational thing – the team decides what makes sense to be a unit for purposes of their understanding of the system and its testing </a:t>
+            </a:r>
+          </a:p>
+          <a:p>
+            <a:endParaRPr lang="en-US" dirty="0" smtClean="0"/>
+          </a:p>
+          <a:p>
+            <a:r>
+              <a:rPr lang="en-US" dirty="0" smtClean="0"/>
+              <a:t>Martin fowler</a:t>
+            </a:r>
+            <a:endParaRPr lang="en-US" dirty="0"/>
+          </a:p>
+          <a:p>
+            <a:r>
+              <a:rPr lang="en-IN" dirty="0" smtClean="0">
+                <a:hlinkClick r:id="rId2"/>
+              </a:rPr>
+              <a:t>https</a:t>
+            </a:r>
+            <a:r>
+              <a:rPr lang="en-IN" dirty="0">
+                <a:hlinkClick r:id="rId2"/>
+              </a:rPr>
+              <a:t>://martinfowler.com/bliki/UnitTest.html</a:t>
+            </a:r>
             <a:endParaRPr lang="en-IN" dirty="0"/>
           </a:p>
         </p:txBody>
       </p:sp>
-      <p:pic>
-        <p:nvPicPr>
-          <p:cNvPr id="1026" name="Picture 2" descr="Benefits of Test-Driven Development | IT Staffing &amp; Technical ..."/>
-          <p:cNvPicPr>
-            <a:picLocks noChangeAspect="1" noChangeArrowheads="1"/>
-          </p:cNvPicPr>
-          <p:nvPr/>
-        </p:nvPicPr>
-        <p:blipFill>
-          <a:blip r:embed="rId2">
-            <a:extLst>
-              <a:ext uri="{28A0092B-C50C-407E-A947-70E740481C1C}">
-                <a14:useLocalDpi xmlns:a14="http://schemas.microsoft.com/office/drawing/2010/main" val="0"/>
-              </a:ext>
-            </a:extLst>
-          </a:blip>
-          <a:srcRect/>
-          <a:stretch>
-            <a:fillRect/>
-          </a:stretch>
-        </p:blipFill>
-        <p:spPr bwMode="auto">
-          <a:xfrm>
-            <a:off x="2911838" y="2705416"/>
-            <a:ext cx="6606524" cy="2689543"/>
-          </a:xfrm>
-          <a:prstGeom prst="rect">
-            <a:avLst/>
-          </a:prstGeom>
-          <a:noFill/>
-          <a:extLst>
-            <a:ext uri="{909E8E84-426E-40DD-AFC4-6F175D3DCCD1}">
-              <a14:hiddenFill xmlns:a14="http://schemas.microsoft.com/office/drawing/2010/main">
-                <a:solidFill>
-                  <a:srgbClr val="FFFFFF"/>
-                </a:solidFill>
-              </a14:hiddenFill>
-            </a:ext>
-          </a:extLst>
-        </p:spPr>
-      </p:pic>
     </p:spTree>
     <p:extLst>
       <p:ext uri="{BB962C8B-B14F-4D97-AF65-F5344CB8AC3E}">
-        <p14:creationId xmlns:p14="http://schemas.microsoft.com/office/powerpoint/2010/main" val="564249852"/>
+        <p14:creationId xmlns:p14="http://schemas.microsoft.com/office/powerpoint/2010/main" val="2560862907"/>
       </p:ext>
     </p:extLst>
   </p:cSld>
@@ -3160,7 +4209,7 @@
 </p:sld>
 </file>
 
-<file path=ppt/slides/slide2.xml><?xml version="1.0" encoding="utf-8"?>
+<file path=ppt/slides/slide11.xml><?xml version="1.0" encoding="utf-8"?>
 <p:sld xmlns:a="http://schemas.openxmlformats.org/drawingml/2006/main" xmlns:r="http://schemas.openxmlformats.org/officeDocument/2006/relationships" xmlns:p="http://schemas.openxmlformats.org/presentationml/2006/main">
   <p:cSld>
     <p:spTree>
@@ -3192,7 +4241,11 @@
           <a:bodyPr/>
           <a:lstStyle/>
           <a:p>
-            <a:endParaRPr lang="en-IN"/>
+            <a:r>
+              <a:rPr lang="en-US" dirty="0" smtClean="0"/>
+              <a:t>Project demo</a:t>
+            </a:r>
+            <a:endParaRPr lang="en-IN" dirty="0"/>
           </a:p>
         </p:txBody>
       </p:sp>
@@ -3211,34 +4264,6 @@
           <a:bodyPr/>
           <a:lstStyle/>
           <a:p>
-            <a:r>
-              <a:rPr lang="en-US" dirty="0" smtClean="0"/>
-              <a:t>It’s a situational thing – the team decides what makes sense to be a unit for purposes of their understanding of the system and its testing </a:t>
-            </a:r>
-          </a:p>
-          <a:p>
-            <a:endParaRPr lang="en-US" dirty="0" smtClean="0"/>
-          </a:p>
-          <a:p>
-            <a:r>
-              <a:rPr lang="en-US" dirty="0" smtClean="0"/>
-              <a:t>Martin fowler</a:t>
-            </a:r>
-            <a:endParaRPr lang="en-US" dirty="0"/>
-          </a:p>
-          <a:p>
-            <a:r>
-              <a:rPr lang="en-IN" dirty="0" smtClean="0">
-                <a:hlinkClick r:id="rId2"/>
-              </a:rPr>
-              <a:t>https</a:t>
-            </a:r>
-            <a:r>
-              <a:rPr lang="en-IN" dirty="0">
-                <a:hlinkClick r:id="rId2"/>
-              </a:rPr>
-              <a:t>://martinfowler.com/bliki/UnitTest.html</a:t>
-            </a:r>
             <a:endParaRPr lang="en-IN" dirty="0"/>
           </a:p>
         </p:txBody>
@@ -3246,7 +4271,7 @@
     </p:spTree>
     <p:extLst>
       <p:ext uri="{BB962C8B-B14F-4D97-AF65-F5344CB8AC3E}">
-        <p14:creationId xmlns:p14="http://schemas.microsoft.com/office/powerpoint/2010/main" val="2560862907"/>
+        <p14:creationId xmlns:p14="http://schemas.microsoft.com/office/powerpoint/2010/main" val="2802644471"/>
       </p:ext>
     </p:extLst>
   </p:cSld>
@@ -3256,7 +4281,7 @@
 </p:sld>
 </file>
 
-<file path=ppt/slides/slide3.xml><?xml version="1.0" encoding="utf-8"?>
+<file path=ppt/slides/slide12.xml><?xml version="1.0" encoding="utf-8"?>
 <p:sld xmlns:a="http://schemas.openxmlformats.org/drawingml/2006/main" xmlns:r="http://schemas.openxmlformats.org/officeDocument/2006/relationships" xmlns:p="http://schemas.openxmlformats.org/presentationml/2006/main">
   <p:cSld>
     <p:spTree>
@@ -3288,174 +4313,11 @@
           <a:bodyPr/>
           <a:lstStyle/>
           <a:p>
-            <a:endParaRPr lang="en-IN"/>
-          </a:p>
-        </p:txBody>
-      </p:sp>
-      <p:pic>
-        <p:nvPicPr>
-          <p:cNvPr id="4" name="Content Placeholder 3"/>
-          <p:cNvPicPr>
-            <a:picLocks noGrp="1" noChangeAspect="1"/>
-          </p:cNvPicPr>
-          <p:nvPr>
-            <p:ph idx="1"/>
-          </p:nvPr>
-        </p:nvPicPr>
-        <p:blipFill>
-          <a:blip r:embed="rId2"/>
-          <a:stretch>
-            <a:fillRect/>
-          </a:stretch>
-        </p:blipFill>
-        <p:spPr>
-          <a:xfrm>
-            <a:off x="3616036" y="2386806"/>
-            <a:ext cx="4876800" cy="3228975"/>
-          </a:xfrm>
-          <a:prstGeom prst="rect">
-            <a:avLst/>
-          </a:prstGeom>
-        </p:spPr>
-      </p:pic>
-    </p:spTree>
-    <p:extLst>
-      <p:ext uri="{BB962C8B-B14F-4D97-AF65-F5344CB8AC3E}">
-        <p14:creationId xmlns:p14="http://schemas.microsoft.com/office/powerpoint/2010/main" val="1044715945"/>
-      </p:ext>
-    </p:extLst>
-  </p:cSld>
-  <p:clrMapOvr>
-    <a:masterClrMapping/>
-  </p:clrMapOvr>
-</p:sld>
-</file>
-
-<file path=ppt/slides/slide4.xml><?xml version="1.0" encoding="utf-8"?>
-<p:sld xmlns:a="http://schemas.openxmlformats.org/drawingml/2006/main" xmlns:r="http://schemas.openxmlformats.org/officeDocument/2006/relationships" xmlns:p="http://schemas.openxmlformats.org/presentationml/2006/main">
-  <p:cSld>
-    <p:spTree>
-      <p:nvGrpSpPr>
-        <p:cNvPr id="1" name=""/>
-        <p:cNvGrpSpPr/>
-        <p:nvPr/>
-      </p:nvGrpSpPr>
-      <p:grpSpPr>
-        <a:xfrm>
-          <a:off x="0" y="0"/>
-          <a:ext cx="0" cy="0"/>
-          <a:chOff x="0" y="0"/>
-          <a:chExt cx="0" cy="0"/>
-        </a:xfrm>
-      </p:grpSpPr>
-      <p:sp>
-        <p:nvSpPr>
-          <p:cNvPr id="2" name="Title 1"/>
-          <p:cNvSpPr>
-            <a:spLocks noGrp="1"/>
-          </p:cNvSpPr>
-          <p:nvPr>
-            <p:ph type="title"/>
-          </p:nvPr>
-        </p:nvSpPr>
-        <p:spPr/>
-        <p:txBody>
-          <a:bodyPr/>
-          <a:lstStyle/>
-          <a:p>
-            <a:endParaRPr lang="en-IN"/>
-          </a:p>
-        </p:txBody>
-      </p:sp>
-      <p:sp>
-        <p:nvSpPr>
-          <p:cNvPr id="3" name="Content Placeholder 2"/>
-          <p:cNvSpPr>
-            <a:spLocks noGrp="1"/>
-          </p:cNvSpPr>
-          <p:nvPr>
-            <p:ph idx="1"/>
-          </p:nvPr>
-        </p:nvSpPr>
-        <p:spPr/>
-        <p:txBody>
-          <a:bodyPr/>
-          <a:lstStyle/>
-          <a:p>
-            <a:endParaRPr lang="en-IN"/>
-          </a:p>
-        </p:txBody>
-      </p:sp>
-      <p:pic>
-        <p:nvPicPr>
-          <p:cNvPr id="4" name="Picture 3"/>
-          <p:cNvPicPr>
-            <a:picLocks noChangeAspect="1"/>
-          </p:cNvPicPr>
-          <p:nvPr/>
-        </p:nvPicPr>
-        <p:blipFill>
-          <a:blip r:embed="rId2"/>
-          <a:stretch>
-            <a:fillRect/>
-          </a:stretch>
-        </p:blipFill>
-        <p:spPr>
-          <a:xfrm>
-            <a:off x="2257425" y="2324894"/>
-            <a:ext cx="7677150" cy="3352800"/>
-          </a:xfrm>
-          <a:prstGeom prst="rect">
-            <a:avLst/>
-          </a:prstGeom>
-        </p:spPr>
-      </p:pic>
-    </p:spTree>
-    <p:extLst>
-      <p:ext uri="{BB962C8B-B14F-4D97-AF65-F5344CB8AC3E}">
-        <p14:creationId xmlns:p14="http://schemas.microsoft.com/office/powerpoint/2010/main" val="1227412737"/>
-      </p:ext>
-    </p:extLst>
-  </p:cSld>
-  <p:clrMapOvr>
-    <a:masterClrMapping/>
-  </p:clrMapOvr>
-</p:sld>
-</file>
-
-<file path=ppt/slides/slide5.xml><?xml version="1.0" encoding="utf-8"?>
-<p:sld xmlns:a="http://schemas.openxmlformats.org/drawingml/2006/main" xmlns:r="http://schemas.openxmlformats.org/officeDocument/2006/relationships" xmlns:p="http://schemas.openxmlformats.org/presentationml/2006/main">
-  <p:cSld>
-    <p:spTree>
-      <p:nvGrpSpPr>
-        <p:cNvPr id="1" name=""/>
-        <p:cNvGrpSpPr/>
-        <p:nvPr/>
-      </p:nvGrpSpPr>
-      <p:grpSpPr>
-        <a:xfrm>
-          <a:off x="0" y="0"/>
-          <a:ext cx="0" cy="0"/>
-          <a:chOff x="0" y="0"/>
-          <a:chExt cx="0" cy="0"/>
-        </a:xfrm>
-      </p:grpSpPr>
-      <p:sp>
-        <p:nvSpPr>
-          <p:cNvPr id="2" name="Title 1"/>
-          <p:cNvSpPr>
-            <a:spLocks noGrp="1"/>
-          </p:cNvSpPr>
-          <p:nvPr>
-            <p:ph type="title"/>
-          </p:nvPr>
-        </p:nvSpPr>
-        <p:spPr/>
-        <p:txBody>
-          <a:bodyPr/>
-          <a:lstStyle/>
-          <a:p>
-            <a:endParaRPr lang="en-IN"/>
+            <a:r>
+              <a:rPr lang="en-US" dirty="0" smtClean="0"/>
+              <a:t>Difference b/w testing lib.</a:t>
+            </a:r>
+            <a:endParaRPr lang="en-IN" dirty="0"/>
           </a:p>
         </p:txBody>
       </p:sp>
@@ -3827,14 +4689,34 @@
                     <a:p>
                       <a:pPr algn="l" fontAlgn="b"/>
                       <a:r>
-                        <a:rPr lang="en-IN" sz="1100" b="0" i="0" u="none" strike="noStrike">
+                        <a:rPr lang="en-IN" sz="1100" b="0" i="0" u="none" strike="noStrike" dirty="0">
                           <a:solidFill>
                             <a:srgbClr val="000000"/>
                           </a:solidFill>
                           <a:effectLst/>
                           <a:latin typeface="Calibri" panose="020F0502020204030204" pitchFamily="34" charset="0"/>
                         </a:rPr>
-                        <a:t>[TestFixture]</a:t>
+                        <a:t>[</a:t>
+                      </a:r>
+                      <a:r>
+                        <a:rPr lang="en-IN" sz="1100" b="0" i="0" u="none" strike="noStrike" dirty="0" err="1">
+                          <a:solidFill>
+                            <a:srgbClr val="000000"/>
+                          </a:solidFill>
+                          <a:effectLst/>
+                          <a:latin typeface="Calibri" panose="020F0502020204030204" pitchFamily="34" charset="0"/>
+                        </a:rPr>
+                        <a:t>TestFixture</a:t>
+                      </a:r>
+                      <a:r>
+                        <a:rPr lang="en-IN" sz="1100" b="0" i="0" u="none" strike="noStrike" dirty="0">
+                          <a:solidFill>
+                            <a:srgbClr val="000000"/>
+                          </a:solidFill>
+                          <a:effectLst/>
+                          <a:latin typeface="Calibri" panose="020F0502020204030204" pitchFamily="34" charset="0"/>
+                        </a:rPr>
+                        <a:t>]</a:t>
                       </a:r>
                     </a:p>
                   </a:txBody>
@@ -3884,7 +4766,7 @@
                     <a:p>
                       <a:pPr algn="l" fontAlgn="b"/>
                       <a:r>
-                        <a:rPr lang="en-IN" sz="1100" b="0" i="0" u="none" strike="noStrike">
+                        <a:rPr lang="en-IN" sz="1100" b="0" i="0" u="none" strike="noStrike" dirty="0">
                           <a:solidFill>
                             <a:srgbClr val="000000"/>
                           </a:solidFill>
@@ -6451,10 +7333,17 @@
   <p:clrMapOvr>
     <a:masterClrMapping/>
   </p:clrMapOvr>
+  <p:timing>
+    <p:tnLst>
+      <p:par>
+        <p:cTn id="1" dur="indefinite" restart="never" nodeType="tmRoot"/>
+      </p:par>
+    </p:tnLst>
+  </p:timing>
 </p:sld>
 </file>
 
-<file path=ppt/slides/slide6.xml><?xml version="1.0" encoding="utf-8"?>
+<file path=ppt/slides/slide13.xml><?xml version="1.0" encoding="utf-8"?>
 <p:sld xmlns:a="http://schemas.openxmlformats.org/drawingml/2006/main" xmlns:r="http://schemas.openxmlformats.org/officeDocument/2006/relationships" xmlns:p="http://schemas.openxmlformats.org/presentationml/2006/main">
   <p:cSld>
     <p:spTree>
@@ -6532,7 +7421,7 @@
 </p:sld>
 </file>
 
-<file path=ppt/slides/slide7.xml><?xml version="1.0" encoding="utf-8"?>
+<file path=ppt/slides/slide14.xml><?xml version="1.0" encoding="utf-8"?>
 <p:sld xmlns:a="http://schemas.openxmlformats.org/drawingml/2006/main" xmlns:r="http://schemas.openxmlformats.org/officeDocument/2006/relationships" xmlns:p="http://schemas.openxmlformats.org/presentationml/2006/main">
   <p:cSld>
     <p:spTree>
@@ -6646,7 +7535,7 @@
 </p:sld>
 </file>
 
-<file path=ppt/slides/slide8.xml><?xml version="1.0" encoding="utf-8"?>
+<file path=ppt/slides/slide15.xml><?xml version="1.0" encoding="utf-8"?>
 <p:sld xmlns:a="http://schemas.openxmlformats.org/drawingml/2006/main" xmlns:r="http://schemas.openxmlformats.org/officeDocument/2006/relationships" xmlns:p="http://schemas.openxmlformats.org/presentationml/2006/main">
   <p:cSld>
     <p:spTree>
@@ -6713,15 +7602,14 @@
               </a:ext>
             </a:extLst>
           </a:blip>
-          <a:srcRect/>
           <a:stretch>
             <a:fillRect/>
           </a:stretch>
         </p:blipFill>
         <p:spPr bwMode="auto">
           <a:xfrm>
-            <a:off x="1951869" y="1825625"/>
-            <a:ext cx="8288262" cy="4351338"/>
+            <a:off x="2240794" y="2120900"/>
+            <a:ext cx="7716761" cy="4051300"/>
           </a:xfrm>
           <a:prstGeom prst="rect">
             <a:avLst/>
@@ -6758,7 +7646,7 @@
 </p:sld>
 </file>
 
-<file path=ppt/slides/slide9.xml><?xml version="1.0" encoding="utf-8"?>
+<file path=ppt/slides/slide16.xml><?xml version="1.0" encoding="utf-8"?>
 <p:sld xmlns:a="http://schemas.openxmlformats.org/drawingml/2006/main" xmlns:r="http://schemas.openxmlformats.org/officeDocument/2006/relationships" xmlns:p="http://schemas.openxmlformats.org/presentationml/2006/main">
   <p:cSld>
     <p:spTree>
@@ -6847,10 +7735,1089 @@
 </p:sld>
 </file>
 
+<file path=ppt/slides/slide17.xml><?xml version="1.0" encoding="utf-8"?>
+<p:sld xmlns:a="http://schemas.openxmlformats.org/drawingml/2006/main" xmlns:r="http://schemas.openxmlformats.org/officeDocument/2006/relationships" xmlns:p="http://schemas.openxmlformats.org/presentationml/2006/main">
+  <p:cSld>
+    <p:spTree>
+      <p:nvGrpSpPr>
+        <p:cNvPr id="1" name=""/>
+        <p:cNvGrpSpPr/>
+        <p:nvPr/>
+      </p:nvGrpSpPr>
+      <p:grpSpPr>
+        <a:xfrm>
+          <a:off x="0" y="0"/>
+          <a:ext cx="0" cy="0"/>
+          <a:chOff x="0" y="0"/>
+          <a:chExt cx="0" cy="0"/>
+        </a:xfrm>
+      </p:grpSpPr>
+      <p:sp>
+        <p:nvSpPr>
+          <p:cNvPr id="2" name="Title 1"/>
+          <p:cNvSpPr>
+            <a:spLocks noGrp="1"/>
+          </p:cNvSpPr>
+          <p:nvPr>
+            <p:ph type="title"/>
+          </p:nvPr>
+        </p:nvSpPr>
+        <p:spPr/>
+        <p:txBody>
+          <a:bodyPr/>
+          <a:lstStyle/>
+          <a:p>
+            <a:r>
+              <a:rPr lang="en-US" dirty="0" smtClean="0"/>
+              <a:t>TDD is easier than I thought</a:t>
+            </a:r>
+            <a:endParaRPr lang="en-IN" dirty="0"/>
+          </a:p>
+        </p:txBody>
+      </p:sp>
+      <p:sp>
+        <p:nvSpPr>
+          <p:cNvPr id="3" name="Content Placeholder 2"/>
+          <p:cNvSpPr>
+            <a:spLocks noGrp="1"/>
+          </p:cNvSpPr>
+          <p:nvPr>
+            <p:ph idx="1"/>
+          </p:nvPr>
+        </p:nvSpPr>
+        <p:spPr/>
+        <p:txBody>
+          <a:bodyPr/>
+          <a:lstStyle/>
+          <a:p>
+            <a:endParaRPr lang="en-IN" dirty="0"/>
+          </a:p>
+        </p:txBody>
+      </p:sp>
+      <p:pic>
+        <p:nvPicPr>
+          <p:cNvPr id="1026" name="Picture 2" descr="Benefits of Test-Driven Development | IT Staffing &amp; Technical ..."/>
+          <p:cNvPicPr>
+            <a:picLocks noChangeAspect="1" noChangeArrowheads="1"/>
+          </p:cNvPicPr>
+          <p:nvPr/>
+        </p:nvPicPr>
+        <p:blipFill>
+          <a:blip r:embed="rId2">
+            <a:extLst>
+              <a:ext uri="{28A0092B-C50C-407E-A947-70E740481C1C}">
+                <a14:useLocalDpi xmlns:a14="http://schemas.microsoft.com/office/drawing/2010/main" val="0"/>
+              </a:ext>
+            </a:extLst>
+          </a:blip>
+          <a:srcRect/>
+          <a:stretch>
+            <a:fillRect/>
+          </a:stretch>
+        </p:blipFill>
+        <p:spPr bwMode="auto">
+          <a:xfrm>
+            <a:off x="2911838" y="2705416"/>
+            <a:ext cx="6606524" cy="2689543"/>
+          </a:xfrm>
+          <a:prstGeom prst="rect">
+            <a:avLst/>
+          </a:prstGeom>
+          <a:noFill/>
+          <a:extLst>
+            <a:ext uri="{909E8E84-426E-40DD-AFC4-6F175D3DCCD1}">
+              <a14:hiddenFill xmlns:a14="http://schemas.microsoft.com/office/drawing/2010/main">
+                <a:solidFill>
+                  <a:srgbClr val="FFFFFF"/>
+                </a:solidFill>
+              </a14:hiddenFill>
+            </a:ext>
+          </a:extLst>
+        </p:spPr>
+      </p:pic>
+    </p:spTree>
+    <p:extLst>
+      <p:ext uri="{BB962C8B-B14F-4D97-AF65-F5344CB8AC3E}">
+        <p14:creationId xmlns:p14="http://schemas.microsoft.com/office/powerpoint/2010/main" val="564249852"/>
+      </p:ext>
+    </p:extLst>
+  </p:cSld>
+  <p:clrMapOvr>
+    <a:masterClrMapping/>
+  </p:clrMapOvr>
+  <p:timing>
+    <p:tnLst>
+      <p:par>
+        <p:cTn id="1" dur="indefinite" restart="never" nodeType="tmRoot"/>
+      </p:par>
+    </p:tnLst>
+  </p:timing>
+</p:sld>
+</file>
+
+<file path=ppt/slides/slide18.xml><?xml version="1.0" encoding="utf-8"?>
+<p:sld xmlns:a="http://schemas.openxmlformats.org/drawingml/2006/main" xmlns:r="http://schemas.openxmlformats.org/officeDocument/2006/relationships" xmlns:p="http://schemas.openxmlformats.org/presentationml/2006/main">
+  <p:cSld>
+    <p:spTree>
+      <p:nvGrpSpPr>
+        <p:cNvPr id="1" name=""/>
+        <p:cNvGrpSpPr/>
+        <p:nvPr/>
+      </p:nvGrpSpPr>
+      <p:grpSpPr>
+        <a:xfrm>
+          <a:off x="0" y="0"/>
+          <a:ext cx="0" cy="0"/>
+          <a:chOff x="0" y="0"/>
+          <a:chExt cx="0" cy="0"/>
+        </a:xfrm>
+      </p:grpSpPr>
+      <p:sp>
+        <p:nvSpPr>
+          <p:cNvPr id="2" name="Title 1"/>
+          <p:cNvSpPr>
+            <a:spLocks noGrp="1"/>
+          </p:cNvSpPr>
+          <p:nvPr>
+            <p:ph type="title"/>
+          </p:nvPr>
+        </p:nvSpPr>
+        <p:spPr/>
+        <p:txBody>
+          <a:bodyPr/>
+          <a:lstStyle/>
+          <a:p>
+            <a:r>
+              <a:rPr lang="en-US" dirty="0" smtClean="0"/>
+              <a:t>Q&amp;A</a:t>
+            </a:r>
+            <a:endParaRPr lang="en-IN" dirty="0"/>
+          </a:p>
+        </p:txBody>
+      </p:sp>
+      <p:sp>
+        <p:nvSpPr>
+          <p:cNvPr id="3" name="Content Placeholder 2"/>
+          <p:cNvSpPr>
+            <a:spLocks noGrp="1"/>
+          </p:cNvSpPr>
+          <p:nvPr>
+            <p:ph idx="1"/>
+          </p:nvPr>
+        </p:nvSpPr>
+        <p:spPr/>
+        <p:txBody>
+          <a:bodyPr/>
+          <a:lstStyle/>
+          <a:p>
+            <a:endParaRPr lang="en-IN" dirty="0"/>
+          </a:p>
+        </p:txBody>
+      </p:sp>
+    </p:spTree>
+    <p:extLst>
+      <p:ext uri="{BB962C8B-B14F-4D97-AF65-F5344CB8AC3E}">
+        <p14:creationId xmlns:p14="http://schemas.microsoft.com/office/powerpoint/2010/main" val="4121564971"/>
+      </p:ext>
+    </p:extLst>
+  </p:cSld>
+  <p:clrMapOvr>
+    <a:masterClrMapping/>
+  </p:clrMapOvr>
+</p:sld>
+</file>
+
+<file path=ppt/slides/slide19.xml><?xml version="1.0" encoding="utf-8"?>
+<p:sld xmlns:a="http://schemas.openxmlformats.org/drawingml/2006/main" xmlns:r="http://schemas.openxmlformats.org/officeDocument/2006/relationships" xmlns:p="http://schemas.openxmlformats.org/presentationml/2006/main">
+  <p:cSld>
+    <p:spTree>
+      <p:nvGrpSpPr>
+        <p:cNvPr id="1" name=""/>
+        <p:cNvGrpSpPr/>
+        <p:nvPr/>
+      </p:nvGrpSpPr>
+      <p:grpSpPr>
+        <a:xfrm>
+          <a:off x="0" y="0"/>
+          <a:ext cx="0" cy="0"/>
+          <a:chOff x="0" y="0"/>
+          <a:chExt cx="0" cy="0"/>
+        </a:xfrm>
+      </p:grpSpPr>
+      <p:sp>
+        <p:nvSpPr>
+          <p:cNvPr id="2" name="Title 1"/>
+          <p:cNvSpPr>
+            <a:spLocks noGrp="1"/>
+          </p:cNvSpPr>
+          <p:nvPr>
+            <p:ph type="title"/>
+          </p:nvPr>
+        </p:nvSpPr>
+        <p:spPr/>
+        <p:txBody>
+          <a:bodyPr/>
+          <a:lstStyle/>
+          <a:p>
+            <a:endParaRPr lang="en-IN"/>
+          </a:p>
+        </p:txBody>
+      </p:sp>
+      <p:sp>
+        <p:nvSpPr>
+          <p:cNvPr id="3" name="Text Placeholder 2"/>
+          <p:cNvSpPr>
+            <a:spLocks noGrp="1"/>
+          </p:cNvSpPr>
+          <p:nvPr>
+            <p:ph type="body" idx="1"/>
+          </p:nvPr>
+        </p:nvSpPr>
+        <p:spPr/>
+        <p:txBody>
+          <a:bodyPr/>
+          <a:lstStyle/>
+          <a:p>
+            <a:endParaRPr lang="en-IN"/>
+          </a:p>
+        </p:txBody>
+      </p:sp>
+    </p:spTree>
+    <p:extLst>
+      <p:ext uri="{BB962C8B-B14F-4D97-AF65-F5344CB8AC3E}">
+        <p14:creationId xmlns:p14="http://schemas.microsoft.com/office/powerpoint/2010/main" val="1127855200"/>
+      </p:ext>
+    </p:extLst>
+  </p:cSld>
+  <p:clrMapOvr>
+    <a:masterClrMapping/>
+  </p:clrMapOvr>
+</p:sld>
+</file>
+
+<file path=ppt/slides/slide2.xml><?xml version="1.0" encoding="utf-8"?>
+<p:sld xmlns:a="http://schemas.openxmlformats.org/drawingml/2006/main" xmlns:r="http://schemas.openxmlformats.org/officeDocument/2006/relationships" xmlns:p="http://schemas.openxmlformats.org/presentationml/2006/main">
+  <p:cSld>
+    <p:spTree>
+      <p:nvGrpSpPr>
+        <p:cNvPr id="1" name=""/>
+        <p:cNvGrpSpPr/>
+        <p:nvPr/>
+      </p:nvGrpSpPr>
+      <p:grpSpPr>
+        <a:xfrm>
+          <a:off x="0" y="0"/>
+          <a:ext cx="0" cy="0"/>
+          <a:chOff x="0" y="0"/>
+          <a:chExt cx="0" cy="0"/>
+        </a:xfrm>
+      </p:grpSpPr>
+      <p:sp>
+        <p:nvSpPr>
+          <p:cNvPr id="2" name="Title 1"/>
+          <p:cNvSpPr>
+            <a:spLocks noGrp="1"/>
+          </p:cNvSpPr>
+          <p:nvPr>
+            <p:ph type="title"/>
+          </p:nvPr>
+        </p:nvSpPr>
+        <p:spPr/>
+        <p:txBody>
+          <a:bodyPr/>
+          <a:lstStyle/>
+          <a:p>
+            <a:r>
+              <a:rPr lang="en-US" dirty="0" smtClean="0"/>
+              <a:t>Agenda</a:t>
+            </a:r>
+            <a:endParaRPr lang="en-IN" dirty="0"/>
+          </a:p>
+        </p:txBody>
+      </p:sp>
+      <p:sp>
+        <p:nvSpPr>
+          <p:cNvPr id="3" name="Content Placeholder 2"/>
+          <p:cNvSpPr>
+            <a:spLocks noGrp="1"/>
+          </p:cNvSpPr>
+          <p:nvPr>
+            <p:ph idx="1"/>
+          </p:nvPr>
+        </p:nvSpPr>
+        <p:spPr/>
+        <p:txBody>
+          <a:bodyPr>
+            <a:normAutofit/>
+          </a:bodyPr>
+          <a:lstStyle/>
+          <a:p>
+            <a:r>
+              <a:rPr lang="en-GB" dirty="0"/>
+              <a:t>Testable code – Domain centric architecture</a:t>
+            </a:r>
+          </a:p>
+          <a:p>
+            <a:r>
+              <a:rPr lang="en-GB" dirty="0" err="1"/>
+              <a:t>NUnit</a:t>
+            </a:r>
+            <a:endParaRPr lang="en-GB" dirty="0"/>
+          </a:p>
+          <a:p>
+            <a:r>
+              <a:rPr lang="en-GB" dirty="0" err="1"/>
+              <a:t>Moq</a:t>
+            </a:r>
+            <a:r>
+              <a:rPr lang="en-GB" dirty="0"/>
+              <a:t> – How it works</a:t>
+            </a:r>
+          </a:p>
+          <a:p>
+            <a:r>
+              <a:rPr lang="en-GB" dirty="0"/>
+              <a:t>Demo unit testing</a:t>
+            </a:r>
+          </a:p>
+          <a:p>
+            <a:r>
+              <a:rPr lang="en-GB" dirty="0"/>
+              <a:t>Demo integration testing</a:t>
+            </a:r>
+          </a:p>
+          <a:p>
+            <a:r>
+              <a:rPr lang="en-GB" dirty="0"/>
+              <a:t>Unit testing and Integration testing</a:t>
+            </a:r>
+          </a:p>
+          <a:p>
+            <a:r>
+              <a:rPr lang="en-GB" dirty="0"/>
+              <a:t>What is TDD ?</a:t>
+            </a:r>
+          </a:p>
+          <a:p>
+            <a:r>
+              <a:rPr lang="en-GB" dirty="0"/>
+              <a:t>What is </a:t>
+            </a:r>
+            <a:r>
+              <a:rPr lang="en-GB" dirty="0" err="1"/>
+              <a:t>Sonarcube</a:t>
+            </a:r>
+            <a:endParaRPr lang="en-GB" dirty="0"/>
+          </a:p>
+          <a:p>
+            <a:r>
+              <a:rPr lang="en-GB" dirty="0"/>
+              <a:t>Q &amp; A</a:t>
+            </a:r>
+          </a:p>
+          <a:p>
+            <a:endParaRPr lang="en-IN" dirty="0"/>
+          </a:p>
+        </p:txBody>
+      </p:sp>
+    </p:spTree>
+    <p:extLst>
+      <p:ext uri="{BB962C8B-B14F-4D97-AF65-F5344CB8AC3E}">
+        <p14:creationId xmlns:p14="http://schemas.microsoft.com/office/powerpoint/2010/main" val="2008854928"/>
+      </p:ext>
+    </p:extLst>
+  </p:cSld>
+  <p:clrMapOvr>
+    <a:masterClrMapping/>
+  </p:clrMapOvr>
+  <p:timing>
+    <p:tnLst>
+      <p:par>
+        <p:cTn id="1" dur="indefinite" restart="never" nodeType="tmRoot"/>
+      </p:par>
+    </p:tnLst>
+  </p:timing>
+</p:sld>
+</file>
+
+<file path=ppt/slides/slide3.xml><?xml version="1.0" encoding="utf-8"?>
+<p:sld xmlns:a="http://schemas.openxmlformats.org/drawingml/2006/main" xmlns:r="http://schemas.openxmlformats.org/officeDocument/2006/relationships" xmlns:p="http://schemas.openxmlformats.org/presentationml/2006/main">
+  <p:cSld>
+    <p:spTree>
+      <p:nvGrpSpPr>
+        <p:cNvPr id="1" name=""/>
+        <p:cNvGrpSpPr/>
+        <p:nvPr/>
+      </p:nvGrpSpPr>
+      <p:grpSpPr>
+        <a:xfrm>
+          <a:off x="0" y="0"/>
+          <a:ext cx="0" cy="0"/>
+          <a:chOff x="0" y="0"/>
+          <a:chExt cx="0" cy="0"/>
+        </a:xfrm>
+      </p:grpSpPr>
+      <p:sp>
+        <p:nvSpPr>
+          <p:cNvPr id="2" name="Title 1"/>
+          <p:cNvSpPr>
+            <a:spLocks noGrp="1"/>
+          </p:cNvSpPr>
+          <p:nvPr>
+            <p:ph type="title"/>
+          </p:nvPr>
+        </p:nvSpPr>
+        <p:spPr/>
+        <p:txBody>
+          <a:bodyPr/>
+          <a:lstStyle/>
+          <a:p>
+            <a:r>
+              <a:rPr lang="en-US" dirty="0" smtClean="0"/>
+              <a:t>DATABASE-CENTRIC VS.</a:t>
+            </a:r>
+            <a:br>
+              <a:rPr lang="en-US" dirty="0" smtClean="0"/>
+            </a:br>
+            <a:r>
+              <a:rPr lang="en-US" dirty="0" smtClean="0"/>
+              <a:t>Domain-centric architecture</a:t>
+            </a:r>
+            <a:endParaRPr lang="en-IN" dirty="0"/>
+          </a:p>
+        </p:txBody>
+      </p:sp>
+      <p:sp>
+        <p:nvSpPr>
+          <p:cNvPr id="3" name="Content Placeholder 2"/>
+          <p:cNvSpPr>
+            <a:spLocks noGrp="1"/>
+          </p:cNvSpPr>
+          <p:nvPr>
+            <p:ph idx="1"/>
+          </p:nvPr>
+        </p:nvSpPr>
+        <p:spPr/>
+        <p:txBody>
+          <a:bodyPr/>
+          <a:lstStyle/>
+          <a:p>
+            <a:endParaRPr lang="en-IN"/>
+          </a:p>
+        </p:txBody>
+      </p:sp>
+      <p:pic>
+        <p:nvPicPr>
+          <p:cNvPr id="4" name="Picture 3"/>
+          <p:cNvPicPr>
+            <a:picLocks noChangeAspect="1"/>
+          </p:cNvPicPr>
+          <p:nvPr/>
+        </p:nvPicPr>
+        <p:blipFill>
+          <a:blip r:embed="rId2"/>
+          <a:stretch>
+            <a:fillRect/>
+          </a:stretch>
+        </p:blipFill>
+        <p:spPr>
+          <a:xfrm>
+            <a:off x="1227909" y="2189416"/>
+            <a:ext cx="9195489" cy="3914775"/>
+          </a:xfrm>
+          <a:prstGeom prst="rect">
+            <a:avLst/>
+          </a:prstGeom>
+        </p:spPr>
+      </p:pic>
+    </p:spTree>
+    <p:extLst>
+      <p:ext uri="{BB962C8B-B14F-4D97-AF65-F5344CB8AC3E}">
+        <p14:creationId xmlns:p14="http://schemas.microsoft.com/office/powerpoint/2010/main" val="341794371"/>
+      </p:ext>
+    </p:extLst>
+  </p:cSld>
+  <p:clrMapOvr>
+    <a:masterClrMapping/>
+  </p:clrMapOvr>
+  <p:timing>
+    <p:tnLst>
+      <p:par>
+        <p:cTn id="1" dur="indefinite" restart="never" nodeType="tmRoot"/>
+      </p:par>
+    </p:tnLst>
+  </p:timing>
+</p:sld>
+</file>
+
+<file path=ppt/slides/slide4.xml><?xml version="1.0" encoding="utf-8"?>
+<p:sld xmlns:a="http://schemas.openxmlformats.org/drawingml/2006/main" xmlns:r="http://schemas.openxmlformats.org/officeDocument/2006/relationships" xmlns:p="http://schemas.openxmlformats.org/presentationml/2006/main">
+  <p:cSld>
+    <p:spTree>
+      <p:nvGrpSpPr>
+        <p:cNvPr id="1" name=""/>
+        <p:cNvGrpSpPr/>
+        <p:nvPr/>
+      </p:nvGrpSpPr>
+      <p:grpSpPr>
+        <a:xfrm>
+          <a:off x="0" y="0"/>
+          <a:ext cx="0" cy="0"/>
+          <a:chOff x="0" y="0"/>
+          <a:chExt cx="0" cy="0"/>
+        </a:xfrm>
+      </p:grpSpPr>
+      <p:sp>
+        <p:nvSpPr>
+          <p:cNvPr id="2" name="Title 1"/>
+          <p:cNvSpPr>
+            <a:spLocks noGrp="1"/>
+          </p:cNvSpPr>
+          <p:nvPr>
+            <p:ph type="title"/>
+          </p:nvPr>
+        </p:nvSpPr>
+        <p:spPr/>
+        <p:txBody>
+          <a:bodyPr/>
+          <a:lstStyle/>
+          <a:p>
+            <a:r>
+              <a:rPr lang="en-US" dirty="0" smtClean="0"/>
+              <a:t>Onion, CLEAN &amp; Hexagonal arch.</a:t>
+            </a:r>
+            <a:endParaRPr lang="en-IN" dirty="0"/>
+          </a:p>
+        </p:txBody>
+      </p:sp>
+      <p:sp>
+        <p:nvSpPr>
+          <p:cNvPr id="3" name="Content Placeholder 2"/>
+          <p:cNvSpPr>
+            <a:spLocks noGrp="1"/>
+          </p:cNvSpPr>
+          <p:nvPr>
+            <p:ph idx="1"/>
+          </p:nvPr>
+        </p:nvSpPr>
+        <p:spPr/>
+        <p:txBody>
+          <a:bodyPr/>
+          <a:lstStyle/>
+          <a:p>
+            <a:r>
+              <a:rPr lang="en-IN" dirty="0" smtClean="0">
+                <a:hlinkClick r:id="rId2"/>
+              </a:rPr>
+              <a:t>https</a:t>
+            </a:r>
+            <a:r>
+              <a:rPr lang="en-IN" dirty="0">
+                <a:hlinkClick r:id="rId2"/>
+              </a:rPr>
+              <a:t>://jeffreypalermo.com/2008/07/the-onion-architecture-part-1</a:t>
+            </a:r>
+            <a:r>
+              <a:rPr lang="en-IN" dirty="0" smtClean="0">
+                <a:hlinkClick r:id="rId2"/>
+              </a:rPr>
+              <a:t>/</a:t>
+            </a:r>
+            <a:endParaRPr lang="en-IN" dirty="0" smtClean="0"/>
+          </a:p>
+          <a:p>
+            <a:r>
+              <a:rPr lang="en-IN" dirty="0">
+                <a:hlinkClick r:id="rId3"/>
+              </a:rPr>
+              <a:t>https://</a:t>
+            </a:r>
+            <a:r>
+              <a:rPr lang="en-IN" dirty="0" smtClean="0">
+                <a:hlinkClick r:id="rId3"/>
+              </a:rPr>
+              <a:t>blog.cleancoder.com/uncle-bob/2012/08/13/the-clean-architecture.html</a:t>
+            </a:r>
+            <a:endParaRPr lang="en-IN" dirty="0" smtClean="0"/>
+          </a:p>
+          <a:p>
+            <a:r>
+              <a:rPr lang="en-IN" dirty="0">
+                <a:hlinkClick r:id="rId4"/>
+              </a:rPr>
+              <a:t>https://alistair.cockburn.us/hexagonal+architecture</a:t>
+            </a:r>
+            <a:endParaRPr lang="en-IN" dirty="0"/>
+          </a:p>
+        </p:txBody>
+      </p:sp>
+    </p:spTree>
+    <p:extLst>
+      <p:ext uri="{BB962C8B-B14F-4D97-AF65-F5344CB8AC3E}">
+        <p14:creationId xmlns:p14="http://schemas.microsoft.com/office/powerpoint/2010/main" val="401525593"/>
+      </p:ext>
+    </p:extLst>
+  </p:cSld>
+  <p:clrMapOvr>
+    <a:masterClrMapping/>
+  </p:clrMapOvr>
+  <p:timing>
+    <p:tnLst>
+      <p:par>
+        <p:cTn id="1" dur="indefinite" restart="never" nodeType="tmRoot"/>
+      </p:par>
+    </p:tnLst>
+  </p:timing>
+</p:sld>
+</file>
+
+<file path=ppt/slides/slide5.xml><?xml version="1.0" encoding="utf-8"?>
+<p:sld xmlns:a="http://schemas.openxmlformats.org/drawingml/2006/main" xmlns:r="http://schemas.openxmlformats.org/officeDocument/2006/relationships" xmlns:p="http://schemas.openxmlformats.org/presentationml/2006/main">
+  <p:cSld>
+    <p:spTree>
+      <p:nvGrpSpPr>
+        <p:cNvPr id="1" name=""/>
+        <p:cNvGrpSpPr/>
+        <p:nvPr/>
+      </p:nvGrpSpPr>
+      <p:grpSpPr>
+        <a:xfrm>
+          <a:off x="0" y="0"/>
+          <a:ext cx="0" cy="0"/>
+          <a:chOff x="0" y="0"/>
+          <a:chExt cx="0" cy="0"/>
+        </a:xfrm>
+      </p:grpSpPr>
+      <p:sp>
+        <p:nvSpPr>
+          <p:cNvPr id="2" name="Title 1"/>
+          <p:cNvSpPr>
+            <a:spLocks noGrp="1"/>
+          </p:cNvSpPr>
+          <p:nvPr>
+            <p:ph type="title"/>
+          </p:nvPr>
+        </p:nvSpPr>
+        <p:spPr/>
+        <p:txBody>
+          <a:bodyPr/>
+          <a:lstStyle/>
+          <a:p>
+            <a:r>
+              <a:rPr lang="en-US" dirty="0" smtClean="0"/>
+              <a:t>It’s all same thing</a:t>
+            </a:r>
+            <a:endParaRPr lang="en-IN" dirty="0"/>
+          </a:p>
+        </p:txBody>
+      </p:sp>
+      <p:sp>
+        <p:nvSpPr>
+          <p:cNvPr id="3" name="Content Placeholder 2"/>
+          <p:cNvSpPr>
+            <a:spLocks noGrp="1"/>
+          </p:cNvSpPr>
+          <p:nvPr>
+            <p:ph idx="1"/>
+          </p:nvPr>
+        </p:nvSpPr>
+        <p:spPr/>
+        <p:txBody>
+          <a:bodyPr/>
+          <a:lstStyle/>
+          <a:p>
+            <a:r>
+              <a:rPr lang="en-IN" dirty="0">
+                <a:hlinkClick r:id="rId2"/>
+              </a:rPr>
+              <a:t>https://blog.ploeh.dk/2013/12/03/layers-onions-ports-adapters-its-all-the-same/</a:t>
+            </a:r>
+            <a:endParaRPr lang="en-IN" dirty="0"/>
+          </a:p>
+        </p:txBody>
+      </p:sp>
+      <p:pic>
+        <p:nvPicPr>
+          <p:cNvPr id="4" name="Picture 3"/>
+          <p:cNvPicPr>
+            <a:picLocks noChangeAspect="1"/>
+          </p:cNvPicPr>
+          <p:nvPr/>
+        </p:nvPicPr>
+        <p:blipFill>
+          <a:blip r:embed="rId3"/>
+          <a:stretch>
+            <a:fillRect/>
+          </a:stretch>
+        </p:blipFill>
+        <p:spPr>
+          <a:xfrm>
+            <a:off x="1879201" y="2728939"/>
+            <a:ext cx="8648700" cy="3619500"/>
+          </a:xfrm>
+          <a:prstGeom prst="rect">
+            <a:avLst/>
+          </a:prstGeom>
+        </p:spPr>
+      </p:pic>
+    </p:spTree>
+    <p:extLst>
+      <p:ext uri="{BB962C8B-B14F-4D97-AF65-F5344CB8AC3E}">
+        <p14:creationId xmlns:p14="http://schemas.microsoft.com/office/powerpoint/2010/main" val="3975967525"/>
+      </p:ext>
+    </p:extLst>
+  </p:cSld>
+  <p:clrMapOvr>
+    <a:masterClrMapping/>
+  </p:clrMapOvr>
+  <p:timing>
+    <p:tnLst>
+      <p:par>
+        <p:cTn id="1" dur="indefinite" restart="never" nodeType="tmRoot"/>
+      </p:par>
+    </p:tnLst>
+  </p:timing>
+</p:sld>
+</file>
+
+<file path=ppt/slides/slide6.xml><?xml version="1.0" encoding="utf-8"?>
+<p:sld xmlns:a="http://schemas.openxmlformats.org/drawingml/2006/main" xmlns:r="http://schemas.openxmlformats.org/officeDocument/2006/relationships" xmlns:p="http://schemas.openxmlformats.org/presentationml/2006/main">
+  <p:cSld>
+    <p:spTree>
+      <p:nvGrpSpPr>
+        <p:cNvPr id="1" name=""/>
+        <p:cNvGrpSpPr/>
+        <p:nvPr/>
+      </p:nvGrpSpPr>
+      <p:grpSpPr>
+        <a:xfrm>
+          <a:off x="0" y="0"/>
+          <a:ext cx="0" cy="0"/>
+          <a:chOff x="0" y="0"/>
+          <a:chExt cx="0" cy="0"/>
+        </a:xfrm>
+      </p:grpSpPr>
+      <p:sp>
+        <p:nvSpPr>
+          <p:cNvPr id="2" name="Title 1"/>
+          <p:cNvSpPr>
+            <a:spLocks noGrp="1"/>
+          </p:cNvSpPr>
+          <p:nvPr>
+            <p:ph type="title"/>
+          </p:nvPr>
+        </p:nvSpPr>
+        <p:spPr/>
+        <p:txBody>
+          <a:bodyPr/>
+          <a:lstStyle/>
+          <a:p>
+            <a:endParaRPr lang="en-IN"/>
+          </a:p>
+        </p:txBody>
+      </p:sp>
+      <p:pic>
+        <p:nvPicPr>
+          <p:cNvPr id="4" name="Content Placeholder 3"/>
+          <p:cNvPicPr>
+            <a:picLocks noGrp="1" noChangeAspect="1"/>
+          </p:cNvPicPr>
+          <p:nvPr>
+            <p:ph idx="1"/>
+          </p:nvPr>
+        </p:nvPicPr>
+        <p:blipFill>
+          <a:blip r:embed="rId2">
+            <a:extLst>
+              <a:ext uri="{28A0092B-C50C-407E-A947-70E740481C1C}">
+                <a14:useLocalDpi xmlns:a14="http://schemas.microsoft.com/office/drawing/2010/main" val="0"/>
+              </a:ext>
+            </a:extLst>
+          </a:blip>
+          <a:stretch>
+            <a:fillRect/>
+          </a:stretch>
+        </p:blipFill>
+        <p:spPr>
+          <a:xfrm>
+            <a:off x="4872445" y="2093976"/>
+            <a:ext cx="3229791" cy="4098474"/>
+          </a:xfrm>
+        </p:spPr>
+      </p:pic>
+    </p:spTree>
+    <p:extLst>
+      <p:ext uri="{BB962C8B-B14F-4D97-AF65-F5344CB8AC3E}">
+        <p14:creationId xmlns:p14="http://schemas.microsoft.com/office/powerpoint/2010/main" val="1811031861"/>
+      </p:ext>
+    </p:extLst>
+  </p:cSld>
+  <p:clrMapOvr>
+    <a:masterClrMapping/>
+  </p:clrMapOvr>
+</p:sld>
+</file>
+
+<file path=ppt/slides/slide7.xml><?xml version="1.0" encoding="utf-8"?>
+<p:sld xmlns:a="http://schemas.openxmlformats.org/drawingml/2006/main" xmlns:r="http://schemas.openxmlformats.org/officeDocument/2006/relationships" xmlns:p="http://schemas.openxmlformats.org/presentationml/2006/main">
+  <p:cSld>
+    <p:spTree>
+      <p:nvGrpSpPr>
+        <p:cNvPr id="1" name=""/>
+        <p:cNvGrpSpPr/>
+        <p:nvPr/>
+      </p:nvGrpSpPr>
+      <p:grpSpPr>
+        <a:xfrm>
+          <a:off x="0" y="0"/>
+          <a:ext cx="0" cy="0"/>
+          <a:chOff x="0" y="0"/>
+          <a:chExt cx="0" cy="0"/>
+        </a:xfrm>
+      </p:grpSpPr>
+      <p:sp>
+        <p:nvSpPr>
+          <p:cNvPr id="2" name="Title 1"/>
+          <p:cNvSpPr>
+            <a:spLocks noGrp="1"/>
+          </p:cNvSpPr>
+          <p:nvPr>
+            <p:ph type="title"/>
+          </p:nvPr>
+        </p:nvSpPr>
+        <p:spPr/>
+        <p:txBody>
+          <a:bodyPr/>
+          <a:lstStyle/>
+          <a:p>
+            <a:r>
+              <a:rPr lang="en-US" dirty="0" smtClean="0"/>
+              <a:t>Project demo</a:t>
+            </a:r>
+            <a:endParaRPr lang="en-IN" dirty="0"/>
+          </a:p>
+        </p:txBody>
+      </p:sp>
+      <p:sp>
+        <p:nvSpPr>
+          <p:cNvPr id="3" name="Content Placeholder 2"/>
+          <p:cNvSpPr>
+            <a:spLocks noGrp="1"/>
+          </p:cNvSpPr>
+          <p:nvPr>
+            <p:ph idx="1"/>
+          </p:nvPr>
+        </p:nvSpPr>
+        <p:spPr/>
+        <p:txBody>
+          <a:bodyPr/>
+          <a:lstStyle/>
+          <a:p>
+            <a:pPr marL="0" indent="0">
+              <a:buNone/>
+            </a:pPr>
+            <a:endParaRPr lang="en-IN" dirty="0"/>
+          </a:p>
+        </p:txBody>
+      </p:sp>
+    </p:spTree>
+    <p:extLst>
+      <p:ext uri="{BB962C8B-B14F-4D97-AF65-F5344CB8AC3E}">
+        <p14:creationId xmlns:p14="http://schemas.microsoft.com/office/powerpoint/2010/main" val="2392015522"/>
+      </p:ext>
+    </p:extLst>
+  </p:cSld>
+  <p:clrMapOvr>
+    <a:masterClrMapping/>
+  </p:clrMapOvr>
+</p:sld>
+</file>
+
+<file path=ppt/slides/slide8.xml><?xml version="1.0" encoding="utf-8"?>
+<p:sld xmlns:a="http://schemas.openxmlformats.org/drawingml/2006/main" xmlns:r="http://schemas.openxmlformats.org/officeDocument/2006/relationships" xmlns:p="http://schemas.openxmlformats.org/presentationml/2006/main">
+  <p:cSld>
+    <p:spTree>
+      <p:nvGrpSpPr>
+        <p:cNvPr id="1" name=""/>
+        <p:cNvGrpSpPr/>
+        <p:nvPr/>
+      </p:nvGrpSpPr>
+      <p:grpSpPr>
+        <a:xfrm>
+          <a:off x="0" y="0"/>
+          <a:ext cx="0" cy="0"/>
+          <a:chOff x="0" y="0"/>
+          <a:chExt cx="0" cy="0"/>
+        </a:xfrm>
+      </p:grpSpPr>
+      <p:sp>
+        <p:nvSpPr>
+          <p:cNvPr id="2" name="Title 1"/>
+          <p:cNvSpPr>
+            <a:spLocks noGrp="1"/>
+          </p:cNvSpPr>
+          <p:nvPr>
+            <p:ph type="title"/>
+          </p:nvPr>
+        </p:nvSpPr>
+        <p:spPr/>
+        <p:txBody>
+          <a:bodyPr/>
+          <a:lstStyle/>
+          <a:p>
+            <a:endParaRPr lang="en-IN"/>
+          </a:p>
+        </p:txBody>
+      </p:sp>
+      <p:pic>
+        <p:nvPicPr>
+          <p:cNvPr id="4" name="Content Placeholder 3"/>
+          <p:cNvPicPr>
+            <a:picLocks noGrp="1" noChangeAspect="1"/>
+          </p:cNvPicPr>
+          <p:nvPr>
+            <p:ph idx="1"/>
+          </p:nvPr>
+        </p:nvPicPr>
+        <p:blipFill>
+          <a:blip r:embed="rId2"/>
+          <a:stretch>
+            <a:fillRect/>
+          </a:stretch>
+        </p:blipFill>
+        <p:spPr>
+          <a:xfrm>
+            <a:off x="3616036" y="2386806"/>
+            <a:ext cx="4876800" cy="3228975"/>
+          </a:xfrm>
+          <a:prstGeom prst="rect">
+            <a:avLst/>
+          </a:prstGeom>
+        </p:spPr>
+      </p:pic>
+    </p:spTree>
+    <p:extLst>
+      <p:ext uri="{BB962C8B-B14F-4D97-AF65-F5344CB8AC3E}">
+        <p14:creationId xmlns:p14="http://schemas.microsoft.com/office/powerpoint/2010/main" val="1044715945"/>
+      </p:ext>
+    </p:extLst>
+  </p:cSld>
+  <p:clrMapOvr>
+    <a:masterClrMapping/>
+  </p:clrMapOvr>
+  <p:timing>
+    <p:tnLst>
+      <p:par>
+        <p:cTn id="1" dur="indefinite" restart="never" nodeType="tmRoot"/>
+      </p:par>
+    </p:tnLst>
+  </p:timing>
+</p:sld>
+</file>
+
+<file path=ppt/slides/slide9.xml><?xml version="1.0" encoding="utf-8"?>
+<p:sld xmlns:a="http://schemas.openxmlformats.org/drawingml/2006/main" xmlns:r="http://schemas.openxmlformats.org/officeDocument/2006/relationships" xmlns:p="http://schemas.openxmlformats.org/presentationml/2006/main">
+  <p:cSld>
+    <p:spTree>
+      <p:nvGrpSpPr>
+        <p:cNvPr id="1" name=""/>
+        <p:cNvGrpSpPr/>
+        <p:nvPr/>
+      </p:nvGrpSpPr>
+      <p:grpSpPr>
+        <a:xfrm>
+          <a:off x="0" y="0"/>
+          <a:ext cx="0" cy="0"/>
+          <a:chOff x="0" y="0"/>
+          <a:chExt cx="0" cy="0"/>
+        </a:xfrm>
+      </p:grpSpPr>
+      <p:sp>
+        <p:nvSpPr>
+          <p:cNvPr id="2" name="Title 1"/>
+          <p:cNvSpPr>
+            <a:spLocks noGrp="1"/>
+          </p:cNvSpPr>
+          <p:nvPr>
+            <p:ph type="title"/>
+          </p:nvPr>
+        </p:nvSpPr>
+        <p:spPr/>
+        <p:txBody>
+          <a:bodyPr/>
+          <a:lstStyle/>
+          <a:p>
+            <a:endParaRPr lang="en-IN"/>
+          </a:p>
+        </p:txBody>
+      </p:sp>
+      <p:sp>
+        <p:nvSpPr>
+          <p:cNvPr id="3" name="Content Placeholder 2"/>
+          <p:cNvSpPr>
+            <a:spLocks noGrp="1"/>
+          </p:cNvSpPr>
+          <p:nvPr>
+            <p:ph idx="1"/>
+          </p:nvPr>
+        </p:nvSpPr>
+        <p:spPr/>
+        <p:txBody>
+          <a:bodyPr/>
+          <a:lstStyle/>
+          <a:p>
+            <a:endParaRPr lang="en-IN"/>
+          </a:p>
+        </p:txBody>
+      </p:sp>
+      <p:pic>
+        <p:nvPicPr>
+          <p:cNvPr id="4" name="Picture 3"/>
+          <p:cNvPicPr>
+            <a:picLocks noChangeAspect="1"/>
+          </p:cNvPicPr>
+          <p:nvPr/>
+        </p:nvPicPr>
+        <p:blipFill>
+          <a:blip r:embed="rId2"/>
+          <a:stretch>
+            <a:fillRect/>
+          </a:stretch>
+        </p:blipFill>
+        <p:spPr>
+          <a:xfrm>
+            <a:off x="2257425" y="2324894"/>
+            <a:ext cx="7677150" cy="3352800"/>
+          </a:xfrm>
+          <a:prstGeom prst="rect">
+            <a:avLst/>
+          </a:prstGeom>
+        </p:spPr>
+      </p:pic>
+    </p:spTree>
+    <p:extLst>
+      <p:ext uri="{BB962C8B-B14F-4D97-AF65-F5344CB8AC3E}">
+        <p14:creationId xmlns:p14="http://schemas.microsoft.com/office/powerpoint/2010/main" val="1227412737"/>
+      </p:ext>
+    </p:extLst>
+  </p:cSld>
+  <p:clrMapOvr>
+    <a:masterClrMapping/>
+  </p:clrMapOvr>
+  <p:timing>
+    <p:tnLst>
+      <p:par>
+        <p:cTn id="1" dur="indefinite" restart="never" nodeType="tmRoot"/>
+      </p:par>
+    </p:tnLst>
+  </p:timing>
+</p:sld>
+</file>
+
 <file path=ppt/theme/theme1.xml><?xml version="1.0" encoding="utf-8"?>
-<a:theme xmlns:a="http://schemas.openxmlformats.org/drawingml/2006/main" name="Office Theme">
+<a:theme xmlns:a="http://schemas.openxmlformats.org/drawingml/2006/main" name="Wood Type">
   <a:themeElements>
-    <a:clrScheme name="Office">
+    <a:clrScheme name="Wood Type">
       <a:dk1>
         <a:sysClr val="windowText" lastClr="000000"/>
       </a:dk1>
@@ -6858,48 +8825,86 @@
         <a:sysClr val="window" lastClr="FFFFFF"/>
       </a:lt1>
       <a:dk2>
-        <a:srgbClr val="44546A"/>
+        <a:srgbClr val="696464"/>
       </a:dk2>
       <a:lt2>
-        <a:srgbClr val="E7E6E6"/>
+        <a:srgbClr val="E9E5DC"/>
       </a:lt2>
       <a:accent1>
-        <a:srgbClr val="5B9BD5"/>
+        <a:srgbClr val="D34817"/>
       </a:accent1>
       <a:accent2>
-        <a:srgbClr val="ED7D31"/>
+        <a:srgbClr val="9B2D1F"/>
       </a:accent2>
       <a:accent3>
-        <a:srgbClr val="A5A5A5"/>
+        <a:srgbClr val="A28E6A"/>
       </a:accent3>
       <a:accent4>
-        <a:srgbClr val="FFC000"/>
+        <a:srgbClr val="956251"/>
       </a:accent4>
       <a:accent5>
-        <a:srgbClr val="4472C4"/>
+        <a:srgbClr val="918485"/>
       </a:accent5>
       <a:accent6>
-        <a:srgbClr val="70AD47"/>
+        <a:srgbClr val="855D5D"/>
       </a:accent6>
       <a:hlink>
-        <a:srgbClr val="0563C1"/>
+        <a:srgbClr val="CC9900"/>
       </a:hlink>
       <a:folHlink>
-        <a:srgbClr val="954F72"/>
+        <a:srgbClr val="96A9A9"/>
       </a:folHlink>
     </a:clrScheme>
-    <a:fontScheme name="Office">
+    <a:fontScheme name="Wood Type">
       <a:majorFont>
-        <a:latin typeface="Calibri Light" panose="020F0302020204030204"/>
+        <a:latin typeface="Rockwell Condensed" panose="02060603050405020104"/>
         <a:ea typeface=""/>
         <a:cs typeface=""/>
-        <a:font script="Jpan" typeface="游ゴシック Light"/>
-        <a:font script="Hang" typeface="맑은 고딕"/>
-        <a:font script="Hans" typeface="等线 Light"/>
-        <a:font script="Hant" typeface="新細明體"/>
+        <a:font script="Grek" typeface="Cambria"/>
+        <a:font script="Cyrl" typeface="Cambria"/>
+        <a:font script="Jpan" typeface="HG明朝B"/>
+        <a:font script="Hang" typeface="바탕"/>
+        <a:font script="Hans" typeface="方正姚体"/>
+        <a:font script="Hant" typeface="微軟正黑體"/>
         <a:font script="Arab" typeface="Times New Roman"/>
-        <a:font script="Hebr" typeface="Times New Roman"/>
-        <a:font script="Thai" typeface="Angsana New"/>
+        <a:font script="Hebr" typeface="David"/>
+        <a:font script="Thai" typeface="JasmineUPC"/>
+        <a:font script="Ethi" typeface="Nyala"/>
+        <a:font script="Beng" typeface="Vrinda"/>
+        <a:font script="Gujr" typeface="Shruti"/>
+        <a:font script="Khmr" typeface="MoolBoran"/>
+        <a:font script="Knda" typeface="Tunga"/>
+        <a:font script="Guru" typeface="Raavi"/>
+        <a:font script="Cans" typeface="Euphemia"/>
+        <a:font script="Cher" typeface="Plantagenet Cherokee"/>
+        <a:font script="Yiii" typeface="Microsoft Yi Baiti"/>
+        <a:font script="Tibt" typeface="Microsoft Himalaya"/>
+        <a:font script="Thaa" typeface="MV Boli"/>
+        <a:font script="Deva" typeface="Mangal"/>
+        <a:font script="Telu" typeface="Gautami"/>
+        <a:font script="Taml" typeface="Latha"/>
+        <a:font script="Syrc" typeface="Estrangelo Edessa"/>
+        <a:font script="Orya" typeface="Kalinga"/>
+        <a:font script="Mlym" typeface="Kartika"/>
+        <a:font script="Laoo" typeface="DokChampa"/>
+        <a:font script="Sinh" typeface="Iskoola Pota"/>
+        <a:font script="Mong" typeface="Mongolian Baiti"/>
+        <a:font script="Viet" typeface="Arial"/>
+        <a:font script="Uigh" typeface="Microsoft Uighur"/>
+      </a:majorFont>
+      <a:minorFont>
+        <a:latin typeface="Rockwell" panose="02060603020205020403"/>
+        <a:ea typeface=""/>
+        <a:cs typeface=""/>
+        <a:font script="Grek" typeface="Cambria"/>
+        <a:font script="Cyrl" typeface="Cambria"/>
+        <a:font script="Jpan" typeface="HG明朝B"/>
+        <a:font script="Hang" typeface="바탕"/>
+        <a:font script="Hans" typeface="方正姚体"/>
+        <a:font script="Hant" typeface="標楷體"/>
+        <a:font script="Arab" typeface="Times New Roman"/>
+        <a:font script="Hebr" typeface="David"/>
+        <a:font script="Thai" typeface="JasmineUPC"/>
         <a:font script="Ethi" typeface="Nyala"/>
         <a:font script="Beng" typeface="Vrinda"/>
         <a:font script="Gujr" typeface="Shruti"/>
@@ -6922,101 +8927,42 @@
         <a:font script="Mong" typeface="Mongolian Baiti"/>
         <a:font script="Viet" typeface="Times New Roman"/>
         <a:font script="Uigh" typeface="Microsoft Uighur"/>
-        <a:font script="Geor" typeface="Sylfaen"/>
-      </a:majorFont>
-      <a:minorFont>
-        <a:latin typeface="Calibri" panose="020F0502020204030204"/>
-        <a:ea typeface=""/>
-        <a:cs typeface=""/>
-        <a:font script="Jpan" typeface="游ゴシック"/>
-        <a:font script="Hang" typeface="맑은 고딕"/>
-        <a:font script="Hans" typeface="等线"/>
-        <a:font script="Hant" typeface="新細明體"/>
-        <a:font script="Arab" typeface="Arial"/>
-        <a:font script="Hebr" typeface="Arial"/>
-        <a:font script="Thai" typeface="Cordia New"/>
-        <a:font script="Ethi" typeface="Nyala"/>
-        <a:font script="Beng" typeface="Vrinda"/>
-        <a:font script="Gujr" typeface="Shruti"/>
-        <a:font script="Khmr" typeface="DaunPenh"/>
-        <a:font script="Knda" typeface="Tunga"/>
-        <a:font script="Guru" typeface="Raavi"/>
-        <a:font script="Cans" typeface="Euphemia"/>
-        <a:font script="Cher" typeface="Plantagenet Cherokee"/>
-        <a:font script="Yiii" typeface="Microsoft Yi Baiti"/>
-        <a:font script="Tibt" typeface="Microsoft Himalaya"/>
-        <a:font script="Thaa" typeface="MV Boli"/>
-        <a:font script="Deva" typeface="Mangal"/>
-        <a:font script="Telu" typeface="Gautami"/>
-        <a:font script="Taml" typeface="Latha"/>
-        <a:font script="Syrc" typeface="Estrangelo Edessa"/>
-        <a:font script="Orya" typeface="Kalinga"/>
-        <a:font script="Mlym" typeface="Kartika"/>
-        <a:font script="Laoo" typeface="DokChampa"/>
-        <a:font script="Sinh" typeface="Iskoola Pota"/>
-        <a:font script="Mong" typeface="Mongolian Baiti"/>
-        <a:font script="Viet" typeface="Arial"/>
-        <a:font script="Uigh" typeface="Microsoft Uighur"/>
-        <a:font script="Geor" typeface="Sylfaen"/>
       </a:minorFont>
     </a:fontScheme>
-    <a:fmtScheme name="Office">
+    <a:fmtScheme name="Wood Type">
       <a:fillStyleLst>
         <a:solidFill>
           <a:schemeClr val="phClr"/>
         </a:solidFill>
-        <a:gradFill rotWithShape="1">
-          <a:gsLst>
-            <a:gs pos="0">
+        <a:blipFill rotWithShape="1">
+          <a:blip xmlns:r="http://schemas.openxmlformats.org/officeDocument/2006/relationships" r:embed="rId1">
+            <a:duotone>
               <a:schemeClr val="phClr">
-                <a:lumMod val="110000"/>
-                <a:satMod val="105000"/>
-                <a:tint val="67000"/>
+                <a:tint val="70000"/>
+                <a:shade val="63000"/>
               </a:schemeClr>
-            </a:gs>
-            <a:gs pos="50000">
               <a:schemeClr val="phClr">
-                <a:lumMod val="105000"/>
-                <a:satMod val="103000"/>
-                <a:tint val="73000"/>
+                <a:tint val="10000"/>
+                <a:satMod val="150000"/>
               </a:schemeClr>
-            </a:gs>
-            <a:gs pos="100000">
+            </a:duotone>
+          </a:blip>
+          <a:tile tx="0" ty="0" sx="60000" sy="59000" flip="none" algn="tl"/>
+        </a:blipFill>
+        <a:blipFill rotWithShape="1">
+          <a:blip xmlns:r="http://schemas.openxmlformats.org/officeDocument/2006/relationships" r:embed="rId1">
+            <a:duotone>
               <a:schemeClr val="phClr">
-                <a:lumMod val="105000"/>
-                <a:satMod val="109000"/>
-                <a:tint val="81000"/>
+                <a:shade val="36000"/>
+                <a:satMod val="120000"/>
               </a:schemeClr>
-            </a:gs>
-          </a:gsLst>
-          <a:lin ang="5400000" scaled="0"/>
-        </a:gradFill>
-        <a:gradFill rotWithShape="1">
-          <a:gsLst>
-            <a:gs pos="0">
               <a:schemeClr val="phClr">
-                <a:satMod val="103000"/>
-                <a:lumMod val="102000"/>
-                <a:tint val="94000"/>
+                <a:tint val="40000"/>
               </a:schemeClr>
-            </a:gs>
-            <a:gs pos="50000">
-              <a:schemeClr val="phClr">
-                <a:satMod val="110000"/>
-                <a:lumMod val="100000"/>
-                <a:shade val="100000"/>
-              </a:schemeClr>
-            </a:gs>
-            <a:gs pos="100000">
-              <a:schemeClr val="phClr">
-                <a:lumMod val="99000"/>
-                <a:satMod val="120000"/>
-                <a:shade val="78000"/>
-              </a:schemeClr>
-            </a:gs>
-          </a:gsLst>
-          <a:lin ang="5400000" scaled="0"/>
-        </a:gradFill>
+            </a:duotone>
+          </a:blip>
+          <a:tile tx="0" ty="0" sx="60000" sy="59000" flip="none" algn="tl"/>
+        </a:blipFill>
       </a:fillStyleLst>
       <a:lnStyleLst>
         <a:ln w="6350" cap="flat" cmpd="sng" algn="ctr">
@@ -7024,21 +8970,18 @@
             <a:schemeClr val="phClr"/>
           </a:solidFill>
           <a:prstDash val="solid"/>
-          <a:miter lim="800000"/>
         </a:ln>
         <a:ln w="12700" cap="flat" cmpd="sng" algn="ctr">
           <a:solidFill>
             <a:schemeClr val="phClr"/>
           </a:solidFill>
           <a:prstDash val="solid"/>
-          <a:miter lim="800000"/>
         </a:ln>
         <a:ln w="19050" cap="flat" cmpd="sng" algn="ctr">
           <a:solidFill>
             <a:schemeClr val="phClr"/>
           </a:solidFill>
           <a:prstDash val="solid"/>
-          <a:miter lim="800000"/>
         </a:ln>
       </a:lnStyleLst>
       <a:effectStyleLst>
@@ -7046,15 +8989,18 @@
           <a:effectLst/>
         </a:effectStyle>
         <a:effectStyle>
-          <a:effectLst/>
+          <a:effectLst>
+            <a:softEdge rad="12700"/>
+          </a:effectLst>
         </a:effectStyle>
         <a:effectStyle>
           <a:effectLst>
-            <a:outerShdw blurRad="57150" dist="19050" dir="5400000" algn="ctr" rotWithShape="0">
+            <a:outerShdw blurRad="50800" dist="19050" dir="5400000" algn="tl" rotWithShape="0">
               <a:srgbClr val="000000">
-                <a:alpha val="63000"/>
+                <a:alpha val="60000"/>
               </a:srgbClr>
             </a:outerShdw>
+            <a:softEdge rad="12700"/>
           </a:effectLst>
         </a:effectStyle>
       </a:effectStyleLst>
@@ -7064,37 +9010,26 @@
         </a:solidFill>
         <a:solidFill>
           <a:schemeClr val="phClr">
-            <a:tint val="95000"/>
-            <a:satMod val="170000"/>
+            <a:shade val="97000"/>
+            <a:satMod val="150000"/>
           </a:schemeClr>
         </a:solidFill>
-        <a:gradFill rotWithShape="1">
-          <a:gsLst>
-            <a:gs pos="0">
+        <a:blipFill rotWithShape="1">
+          <a:blip xmlns:r="http://schemas.openxmlformats.org/officeDocument/2006/relationships" r:embed="rId1">
+            <a:duotone>
               <a:schemeClr val="phClr">
-                <a:tint val="93000"/>
-                <a:satMod val="150000"/>
-                <a:shade val="98000"/>
-                <a:lumMod val="102000"/>
-              </a:schemeClr>
-            </a:gs>
-            <a:gs pos="50000">
-              <a:schemeClr val="phClr">
-                <a:tint val="98000"/>
-                <a:satMod val="130000"/>
-                <a:shade val="90000"/>
-                <a:lumMod val="103000"/>
-              </a:schemeClr>
-            </a:gs>
-            <a:gs pos="100000">
-              <a:schemeClr val="phClr">
-                <a:shade val="63000"/>
+                <a:tint val="75000"/>
+                <a:shade val="58000"/>
                 <a:satMod val="120000"/>
               </a:schemeClr>
-            </a:gs>
-          </a:gsLst>
-          <a:lin ang="5400000" scaled="0"/>
-        </a:gradFill>
+              <a:schemeClr val="phClr">
+                <a:tint val="50000"/>
+                <a:shade val="96000"/>
+              </a:schemeClr>
+            </a:duotone>
+          </a:blip>
+          <a:tile tx="0" ty="0" sx="100000" sy="100000" flip="none" algn="tl"/>
+        </a:blipFill>
       </a:bgFillStyleLst>
     </a:fmtScheme>
   </a:themeElements>
@@ -7102,7 +9037,7 @@
   <a:extraClrSchemeLst/>
   <a:extLst>
     <a:ext uri="{05A4C25C-085E-4340-85A3-A5531E510DB2}">
-      <thm15:themeFamily xmlns:thm15="http://schemas.microsoft.com/office/thememl/2012/main" name="Office Theme" id="{62F939B6-93AF-4DB8-9C6B-D6C7DFDC589F}" vid="{4A3C46E8-61CC-4603-A589-7422A47A8E4A}"/>
+      <thm15:themeFamily xmlns:thm15="http://schemas.microsoft.com/office/thememl/2012/main" name="Wood Type" id="{7ACABC62-BF99-48CF-A9DC-4DB89C7B13DC}" vid="{142A1326-48AB-42A9-8428-CB14AA30176D}"/>
     </a:ext>
   </a:extLst>
 </a:theme>

</xml_diff>